<commit_message>
add GSOC 2013 application and some modification of UseR 2014 poster.
</commit_message>
<xml_diff>
--- a/papers/UseR_2014_poster.pptx
+++ b/papers/UseR_2014_poster.pptx
@@ -225,7 +225,7 @@
           <a:p>
             <a:fld id="{98710013-9CD6-4924-938E-62F8982C3A00}" type="datetimeFigureOut">
               <a:rPr lang="ko-KR" altLang="en-US" smtClean="0"/>
-              <a:t>2014-06-08</a:t>
+              <a:t>2014-06-09</a:t>
             </a:fld>
             <a:endParaRPr lang="ko-KR" altLang="en-US"/>
           </a:p>
@@ -390,7 +390,7 @@
           <a:p>
             <a:fld id="{9025242E-0E58-427D-AA38-6F327CB7A29E}" type="datetimeFigureOut">
               <a:rPr lang="ko-KR" altLang="en-US" smtClean="0"/>
-              <a:t>2014-06-08</a:t>
+              <a:t>2014-06-09</a:t>
             </a:fld>
             <a:endParaRPr lang="ko-KR" altLang="en-US"/>
           </a:p>
@@ -926,7 +926,7 @@
           <a:p>
             <a:fld id="{E059B02A-7401-45FD-B5BB-7C11F2C0056C}" type="datetimeFigureOut">
               <a:rPr lang="ko-KR" altLang="en-US" smtClean="0"/>
-              <a:t>2014-06-08</a:t>
+              <a:t>2014-06-09</a:t>
             </a:fld>
             <a:endParaRPr lang="ko-KR" altLang="en-US"/>
           </a:p>
@@ -1096,7 +1096,7 @@
           <a:p>
             <a:fld id="{E059B02A-7401-45FD-B5BB-7C11F2C0056C}" type="datetimeFigureOut">
               <a:rPr lang="ko-KR" altLang="en-US" smtClean="0"/>
-              <a:t>2014-06-08</a:t>
+              <a:t>2014-06-09</a:t>
             </a:fld>
             <a:endParaRPr lang="ko-KR" altLang="en-US"/>
           </a:p>
@@ -1276,7 +1276,7 @@
           <a:p>
             <a:fld id="{E059B02A-7401-45FD-B5BB-7C11F2C0056C}" type="datetimeFigureOut">
               <a:rPr lang="ko-KR" altLang="en-US" smtClean="0"/>
-              <a:t>2014-06-08</a:t>
+              <a:t>2014-06-09</a:t>
             </a:fld>
             <a:endParaRPr lang="ko-KR" altLang="en-US"/>
           </a:p>
@@ -1446,7 +1446,7 @@
           <a:p>
             <a:fld id="{E059B02A-7401-45FD-B5BB-7C11F2C0056C}" type="datetimeFigureOut">
               <a:rPr lang="ko-KR" altLang="en-US" smtClean="0"/>
-              <a:t>2014-06-08</a:t>
+              <a:t>2014-06-09</a:t>
             </a:fld>
             <a:endParaRPr lang="ko-KR" altLang="en-US"/>
           </a:p>
@@ -1692,7 +1692,7 @@
           <a:p>
             <a:fld id="{E059B02A-7401-45FD-B5BB-7C11F2C0056C}" type="datetimeFigureOut">
               <a:rPr lang="ko-KR" altLang="en-US" smtClean="0"/>
-              <a:t>2014-06-08</a:t>
+              <a:t>2014-06-09</a:t>
             </a:fld>
             <a:endParaRPr lang="ko-KR" altLang="en-US"/>
           </a:p>
@@ -1980,7 +1980,7 @@
           <a:p>
             <a:fld id="{E059B02A-7401-45FD-B5BB-7C11F2C0056C}" type="datetimeFigureOut">
               <a:rPr lang="ko-KR" altLang="en-US" smtClean="0"/>
-              <a:t>2014-06-08</a:t>
+              <a:t>2014-06-09</a:t>
             </a:fld>
             <a:endParaRPr lang="ko-KR" altLang="en-US"/>
           </a:p>
@@ -2402,7 +2402,7 @@
           <a:p>
             <a:fld id="{E059B02A-7401-45FD-B5BB-7C11F2C0056C}" type="datetimeFigureOut">
               <a:rPr lang="ko-KR" altLang="en-US" smtClean="0"/>
-              <a:t>2014-06-08</a:t>
+              <a:t>2014-06-09</a:t>
             </a:fld>
             <a:endParaRPr lang="ko-KR" altLang="en-US"/>
           </a:p>
@@ -2520,7 +2520,7 @@
           <a:p>
             <a:fld id="{E059B02A-7401-45FD-B5BB-7C11F2C0056C}" type="datetimeFigureOut">
               <a:rPr lang="ko-KR" altLang="en-US" smtClean="0"/>
-              <a:t>2014-06-08</a:t>
+              <a:t>2014-06-09</a:t>
             </a:fld>
             <a:endParaRPr lang="ko-KR" altLang="en-US"/>
           </a:p>
@@ -2615,7 +2615,7 @@
           <a:p>
             <a:fld id="{E059B02A-7401-45FD-B5BB-7C11F2C0056C}" type="datetimeFigureOut">
               <a:rPr lang="ko-KR" altLang="en-US" smtClean="0"/>
-              <a:t>2014-06-08</a:t>
+              <a:t>2014-06-09</a:t>
             </a:fld>
             <a:endParaRPr lang="ko-KR" altLang="en-US"/>
           </a:p>
@@ -2892,7 +2892,7 @@
           <a:p>
             <a:fld id="{E059B02A-7401-45FD-B5BB-7C11F2C0056C}" type="datetimeFigureOut">
               <a:rPr lang="ko-KR" altLang="en-US" smtClean="0"/>
-              <a:t>2014-06-08</a:t>
+              <a:t>2014-06-09</a:t>
             </a:fld>
             <a:endParaRPr lang="ko-KR" altLang="en-US"/>
           </a:p>
@@ -3145,7 +3145,7 @@
           <a:p>
             <a:fld id="{E059B02A-7401-45FD-B5BB-7C11F2C0056C}" type="datetimeFigureOut">
               <a:rPr lang="ko-KR" altLang="en-US" smtClean="0"/>
-              <a:t>2014-06-08</a:t>
+              <a:t>2014-06-09</a:t>
             </a:fld>
             <a:endParaRPr lang="ko-KR" altLang="en-US"/>
           </a:p>
@@ -3358,7 +3358,7 @@
           <a:p>
             <a:fld id="{E059B02A-7401-45FD-B5BB-7C11F2C0056C}" type="datetimeFigureOut">
               <a:rPr lang="ko-KR" altLang="en-US" smtClean="0"/>
-              <a:t>2014-06-08</a:t>
+              <a:t>2014-06-09</a:t>
             </a:fld>
             <a:endParaRPr lang="ko-KR" altLang="en-US"/>
           </a:p>
@@ -4614,7 +4614,7 @@
         <p:spPr>
           <a:xfrm>
             <a:off x="15027176" y="6520897"/>
-            <a:ext cx="14897443" cy="18354664"/>
+            <a:ext cx="14897443" cy="17478301"/>
           </a:xfrm>
           <a:prstGeom prst="rect">
             <a:avLst/>
@@ -4670,8 +4670,8 @@
         </p:nvSpPr>
         <p:spPr>
           <a:xfrm>
-            <a:off x="15027176" y="26156790"/>
-            <a:ext cx="14897443" cy="7766381"/>
+            <a:off x="15027176" y="25375185"/>
+            <a:ext cx="14897443" cy="8547987"/>
           </a:xfrm>
           <a:prstGeom prst="rect">
             <a:avLst/>
@@ -4709,6 +4709,16 @@
           <a:lstStyle/>
           <a:p>
             <a:pPr algn="just"/>
+            <a:r>
+              <a:rPr lang="en-US" altLang="ko-KR" sz="4400" dirty="0" smtClean="0">
+                <a:solidFill>
+                  <a:schemeClr val="tx1"/>
+                </a:solidFill>
+                <a:latin typeface="Times New Roman" panose="02020603050405020304" pitchFamily="18" charset="0"/>
+                <a:cs typeface="Times New Roman" panose="02020603050405020304" pitchFamily="18" charset="0"/>
+              </a:rPr>
+              <a:t>Server offload with shiny.</a:t>
+            </a:r>
             <a:endParaRPr lang="ko-KR" altLang="en-US" sz="4400" dirty="0">
               <a:solidFill>
                 <a:schemeClr val="tx1"/>
@@ -4835,7 +4845,7 @@
         </p:nvSpPr>
         <p:spPr bwMode="auto">
           <a:xfrm>
-            <a:off x="15013238" y="25068600"/>
+            <a:off x="15013238" y="24286995"/>
             <a:ext cx="5760640" cy="1016182"/>
           </a:xfrm>
           <a:prstGeom prst="roundRect">
@@ -5279,28 +5289,7 @@
                 <a:latin typeface="Times New Roman" panose="02020603050405020304" pitchFamily="18" charset="0"/>
                 <a:cs typeface="Times New Roman" panose="02020603050405020304" pitchFamily="18" charset="0"/>
               </a:rPr>
-              <a:t>assigning 1 or 0 to the value of array</a:t>
-            </a:r>
-            <a:r>
-              <a:rPr lang="en-US" altLang="ko-KR" sz="4400" dirty="0" smtClean="0">
-                <a:latin typeface="Times New Roman" panose="02020603050405020304" pitchFamily="18" charset="0"/>
-                <a:cs typeface="Times New Roman" panose="02020603050405020304" pitchFamily="18" charset="0"/>
-              </a:rPr>
-              <a:t>. As shown above, if two nodes from different graphs are connected (e.g. </a:t>
-            </a:r>
-            <a:r>
-              <a:rPr lang="en-US" altLang="ko-KR" sz="4400" dirty="0" smtClean="0">
-                <a:latin typeface="Times New Roman" panose="02020603050405020304" pitchFamily="18" charset="0"/>
-                <a:cs typeface="Times New Roman" panose="02020603050405020304" pitchFamily="18" charset="0"/>
-              </a:rPr>
-              <a:t>node 3 of dot &lt;-&gt; node 0, 1 of line), the appropriate value of the array is set by 1 (e.g. row number 3, and column number 0, 1). </a:t>
-            </a:r>
-            <a:r>
-              <a:rPr lang="en-US" altLang="ko-KR" sz="4400" dirty="0" smtClean="0">
-                <a:latin typeface="Times New Roman" panose="02020603050405020304" pitchFamily="18" charset="0"/>
-                <a:cs typeface="Times New Roman" panose="02020603050405020304" pitchFamily="18" charset="0"/>
-              </a:rPr>
-              <a:t>Therefore, we can figure out how one point in the plot is related to another point in another plot by checking this array. </a:t>
+              <a:t>assigning 1 or 0 to the value of array. As shown above, if two nodes from different graphs are connected (e.g. node 3 of dot &lt;-&gt; node 0, 1 of line), the appropriate value of the array is set by 1 (e.g. row number 3, and column number 0, 1). Therefore, we can figure out how one point in the plot is related to another point in another plot by checking this array. </a:t>
             </a:r>
           </a:p>
         </p:txBody>
@@ -5394,10 +5383,6 @@
               </a:rPr>
               <a:t>Why linked graphs?</a:t>
             </a:r>
-            <a:endParaRPr lang="en-US" altLang="ko-KR" sz="4400" b="1" dirty="0" smtClean="0">
-              <a:latin typeface="Times New Roman" panose="02020603050405020304" pitchFamily="18" charset="0"/>
-              <a:cs typeface="Times New Roman" panose="02020603050405020304" pitchFamily="18" charset="0"/>
-            </a:endParaRPr>
           </a:p>
         </p:txBody>
       </p:sp>
@@ -5513,7 +5498,21 @@
                 <a:latin typeface="Times New Roman" panose="02020603050405020304" pitchFamily="18" charset="0"/>
                 <a:cs typeface="Times New Roman" panose="02020603050405020304" pitchFamily="18" charset="0"/>
               </a:rPr>
-              <a:t>nodes from one graph would show the related nodes of another graph. Because it is common that there are more than 2 fields on one data in many research areas, drawing many graphs of same data can be a critical role for users by helping them to predict and analyze the tendency of data better. Therefore, the bigger the size of data,  the more time it takes for users to find connected node and relationship between graphs so that it can be a bottle neck of making a decision.</a:t>
+              <a:t>nodes from one graph would show the related nodes of another graph. Because it is common that there are more than 2 fields on one data in many research areas, drawing many graphs of same data can be a critical role for users by helping them to predict and analyze the tendency of data better. Therefore, the bigger the size of data,  the more time it takes for users to find connected node and relationship between graphs so that it can be a </a:t>
+            </a:r>
+            <a:r>
+              <a:rPr lang="en-US" altLang="ko-KR" sz="4400" dirty="0" smtClean="0">
+                <a:latin typeface="Times New Roman" panose="02020603050405020304" pitchFamily="18" charset="0"/>
+                <a:cs typeface="Times New Roman" panose="02020603050405020304" pitchFamily="18" charset="0"/>
+              </a:rPr>
+              <a:t>bottleneck </a:t>
+            </a:r>
+            <a:r>
+              <a:rPr lang="en-US" altLang="ko-KR" sz="4400" dirty="0" smtClean="0">
+                <a:latin typeface="Times New Roman" panose="02020603050405020304" pitchFamily="18" charset="0"/>
+                <a:cs typeface="Times New Roman" panose="02020603050405020304" pitchFamily="18" charset="0"/>
+              </a:rPr>
+              <a:t>of making a decision.</a:t>
             </a:r>
           </a:p>
         </p:txBody>
@@ -5551,7 +5550,7 @@
         <p:spPr>
           <a:xfrm>
             <a:off x="15067979" y="20349624"/>
-            <a:ext cx="14758338" cy="769441"/>
+            <a:ext cx="14758338" cy="3477875"/>
           </a:xfrm>
           <a:prstGeom prst="rect">
             <a:avLst/>
@@ -5569,8 +5568,40 @@
                 <a:latin typeface="Times New Roman" panose="02020603050405020304" pitchFamily="18" charset="0"/>
                 <a:cs typeface="Times New Roman" panose="02020603050405020304" pitchFamily="18" charset="0"/>
               </a:rPr>
-              <a:t>Relationship Array also can be used as update  </a:t>
-            </a:r>
+              <a:t>Relationship Array also can be used </a:t>
+            </a:r>
+            <a:r>
+              <a:rPr lang="en-US" altLang="ko-KR" sz="4400" dirty="0" smtClean="0">
+                <a:latin typeface="Times New Roman" panose="02020603050405020304" pitchFamily="18" charset="0"/>
+                <a:cs typeface="Times New Roman" panose="02020603050405020304" pitchFamily="18" charset="0"/>
+              </a:rPr>
+              <a:t>for update sequence. When some nodes of one graph is updated, the correlated node of another graph can be found by multiplying with Relationship Array. We can simply </a:t>
+            </a:r>
+            <a:r>
+              <a:rPr lang="en-US" altLang="ko-KR" sz="4400" dirty="0" smtClean="0">
+                <a:latin typeface="Times New Roman" panose="02020603050405020304" pitchFamily="18" charset="0"/>
+                <a:cs typeface="Times New Roman" panose="02020603050405020304" pitchFamily="18" charset="0"/>
+              </a:rPr>
+              <a:t>propagate updated node numbers using </a:t>
+            </a:r>
+            <a:r>
+              <a:rPr lang="en-US" altLang="ko-KR" sz="4400">
+                <a:latin typeface="Times New Roman" panose="02020603050405020304" pitchFamily="18" charset="0"/>
+                <a:cs typeface="Times New Roman" panose="02020603050405020304" pitchFamily="18" charset="0"/>
+              </a:rPr>
+              <a:t>array </a:t>
+            </a:r>
+            <a:r>
+              <a:rPr lang="en-US" altLang="ko-KR" sz="4400" smtClean="0">
+                <a:latin typeface="Times New Roman" panose="02020603050405020304" pitchFamily="18" charset="0"/>
+                <a:cs typeface="Times New Roman" panose="02020603050405020304" pitchFamily="18" charset="0"/>
+              </a:rPr>
+              <a:t>multiplication.</a:t>
+            </a:r>
+            <a:endParaRPr lang="en-US" altLang="ko-KR" sz="4400" dirty="0" smtClean="0">
+              <a:latin typeface="Times New Roman" panose="02020603050405020304" pitchFamily="18" charset="0"/>
+              <a:cs typeface="Times New Roman" panose="02020603050405020304" pitchFamily="18" charset="0"/>
+            </a:endParaRPr>
           </a:p>
         </p:txBody>
       </p:sp>

</xml_diff>

<commit_message>
some modification of poster
</commit_message>
<xml_diff>
--- a/papers/UseR_2014_poster.pptx
+++ b/papers/UseR_2014_poster.pptx
@@ -4717,7 +4717,60 @@
                 <a:latin typeface="Times New Roman" panose="02020603050405020304" pitchFamily="18" charset="0"/>
                 <a:cs typeface="Times New Roman" panose="02020603050405020304" pitchFamily="18" charset="0"/>
               </a:rPr>
-              <a:t>Server offload with shiny.</a:t>
+              <a:t>Server offload with shiny. </a:t>
+            </a:r>
+          </a:p>
+          <a:p>
+            <a:pPr algn="just"/>
+            <a:r>
+              <a:rPr lang="en-US" altLang="ko-KR" sz="4400" dirty="0" smtClean="0">
+                <a:solidFill>
+                  <a:schemeClr val="tx1"/>
+                </a:solidFill>
+                <a:latin typeface="Times New Roman" panose="02020603050405020304" pitchFamily="18" charset="0"/>
+                <a:cs typeface="Times New Roman" panose="02020603050405020304" pitchFamily="18" charset="0"/>
+              </a:rPr>
+              <a:t>Using JavaScript-based platform can be extended to </a:t>
+            </a:r>
+            <a:r>
+              <a:rPr lang="en-US" altLang="ko-KR" sz="4400" dirty="0" smtClean="0">
+                <a:solidFill>
+                  <a:schemeClr val="tx1"/>
+                </a:solidFill>
+                <a:latin typeface="Times New Roman" panose="02020603050405020304" pitchFamily="18" charset="0"/>
+                <a:cs typeface="Times New Roman" panose="02020603050405020304" pitchFamily="18" charset="0"/>
+              </a:rPr>
+              <a:t>provide server-offload to users by </a:t>
+            </a:r>
+            <a:r>
+              <a:rPr lang="en-US" altLang="ko-KR" sz="4400" dirty="0" smtClean="0">
+                <a:solidFill>
+                  <a:schemeClr val="tx1"/>
+                </a:solidFill>
+                <a:latin typeface="Times New Roman" panose="02020603050405020304" pitchFamily="18" charset="0"/>
+                <a:cs typeface="Times New Roman" panose="02020603050405020304" pitchFamily="18" charset="0"/>
+              </a:rPr>
+              <a:t>taking advantage </a:t>
+            </a:r>
+            <a:r>
+              <a:rPr lang="en-US" altLang="ko-KR" sz="4400" dirty="0" smtClean="0">
+                <a:solidFill>
+                  <a:schemeClr val="tx1"/>
+                </a:solidFill>
+                <a:latin typeface="Times New Roman" panose="02020603050405020304" pitchFamily="18" charset="0"/>
+                <a:cs typeface="Times New Roman" panose="02020603050405020304" pitchFamily="18" charset="0"/>
+              </a:rPr>
+              <a:t>of </a:t>
+            </a:r>
+            <a:r>
+              <a:rPr lang="en-US" altLang="ko-KR" sz="4400" smtClean="0">
+                <a:solidFill>
+                  <a:schemeClr val="tx1"/>
+                </a:solidFill>
+                <a:latin typeface="Times New Roman" panose="02020603050405020304" pitchFamily="18" charset="0"/>
+                <a:cs typeface="Times New Roman" panose="02020603050405020304" pitchFamily="18" charset="0"/>
+              </a:rPr>
+              <a:t>Shiny package.</a:t>
             </a:r>
             <a:endParaRPr lang="ko-KR" altLang="en-US" sz="4400" dirty="0">
               <a:solidFill>
@@ -5498,21 +5551,7 @@
                 <a:latin typeface="Times New Roman" panose="02020603050405020304" pitchFamily="18" charset="0"/>
                 <a:cs typeface="Times New Roman" panose="02020603050405020304" pitchFamily="18" charset="0"/>
               </a:rPr>
-              <a:t>nodes from one graph would show the related nodes of another graph. Because it is common that there are more than 2 fields on one data in many research areas, drawing many graphs of same data can be a critical role for users by helping them to predict and analyze the tendency of data better. Therefore, the bigger the size of data,  the more time it takes for users to find connected node and relationship between graphs so that it can be a </a:t>
-            </a:r>
-            <a:r>
-              <a:rPr lang="en-US" altLang="ko-KR" sz="4400" dirty="0" smtClean="0">
-                <a:latin typeface="Times New Roman" panose="02020603050405020304" pitchFamily="18" charset="0"/>
-                <a:cs typeface="Times New Roman" panose="02020603050405020304" pitchFamily="18" charset="0"/>
-              </a:rPr>
-              <a:t>bottleneck </a:t>
-            </a:r>
-            <a:r>
-              <a:rPr lang="en-US" altLang="ko-KR" sz="4400" dirty="0" smtClean="0">
-                <a:latin typeface="Times New Roman" panose="02020603050405020304" pitchFamily="18" charset="0"/>
-                <a:cs typeface="Times New Roman" panose="02020603050405020304" pitchFamily="18" charset="0"/>
-              </a:rPr>
-              <a:t>of making a decision.</a:t>
+              <a:t>nodes from one graph would show the related nodes of another graph. Because it is common that there are more than 2 fields on one data in many research areas, drawing many graphs of same data can be a critical role for users by helping them to predict and analyze the tendency of data better. Therefore, the bigger the size of data,  the more time it takes for users to find connected node and relationship between graphs so that it can be a bottleneck of making a decision.</a:t>
             </a:r>
           </a:p>
         </p:txBody>
@@ -5568,40 +5607,22 @@
                 <a:latin typeface="Times New Roman" panose="02020603050405020304" pitchFamily="18" charset="0"/>
                 <a:cs typeface="Times New Roman" panose="02020603050405020304" pitchFamily="18" charset="0"/>
               </a:rPr>
-              <a:t>Relationship Array also can be used </a:t>
+              <a:t>Relationship Array also can be used for update sequence. When some nodes of one graph is updated, the correlated node of another graph can be found by multiplying with Relationship Array. In this manner, we can simply propagate updated node numbers using </a:t>
+            </a:r>
+            <a:r>
+              <a:rPr lang="en-US" altLang="ko-KR" sz="4400" dirty="0">
+                <a:latin typeface="Times New Roman" panose="02020603050405020304" pitchFamily="18" charset="0"/>
+                <a:cs typeface="Times New Roman" panose="02020603050405020304" pitchFamily="18" charset="0"/>
+              </a:rPr>
+              <a:t>array </a:t>
             </a:r>
             <a:r>
               <a:rPr lang="en-US" altLang="ko-KR" sz="4400" dirty="0" smtClean="0">
                 <a:latin typeface="Times New Roman" panose="02020603050405020304" pitchFamily="18" charset="0"/>
                 <a:cs typeface="Times New Roman" panose="02020603050405020304" pitchFamily="18" charset="0"/>
               </a:rPr>
-              <a:t>for update sequence. When some nodes of one graph is updated, the correlated node of another graph can be found by multiplying with Relationship Array. We can simply </a:t>
-            </a:r>
-            <a:r>
-              <a:rPr lang="en-US" altLang="ko-KR" sz="4400" dirty="0" smtClean="0">
-                <a:latin typeface="Times New Roman" panose="02020603050405020304" pitchFamily="18" charset="0"/>
-                <a:cs typeface="Times New Roman" panose="02020603050405020304" pitchFamily="18" charset="0"/>
-              </a:rPr>
-              <a:t>propagate updated node numbers using </a:t>
-            </a:r>
-            <a:r>
-              <a:rPr lang="en-US" altLang="ko-KR" sz="4400">
-                <a:latin typeface="Times New Roman" panose="02020603050405020304" pitchFamily="18" charset="0"/>
-                <a:cs typeface="Times New Roman" panose="02020603050405020304" pitchFamily="18" charset="0"/>
-              </a:rPr>
-              <a:t>array </a:t>
-            </a:r>
-            <a:r>
-              <a:rPr lang="en-US" altLang="ko-KR" sz="4400" smtClean="0">
-                <a:latin typeface="Times New Roman" panose="02020603050405020304" pitchFamily="18" charset="0"/>
-                <a:cs typeface="Times New Roman" panose="02020603050405020304" pitchFamily="18" charset="0"/>
-              </a:rPr>
               <a:t>multiplication.</a:t>
             </a:r>
-            <a:endParaRPr lang="en-US" altLang="ko-KR" sz="4400" dirty="0" smtClean="0">
-              <a:latin typeface="Times New Roman" panose="02020603050405020304" pitchFamily="18" charset="0"/>
-              <a:cs typeface="Times New Roman" panose="02020603050405020304" pitchFamily="18" charset="0"/>
-            </a:endParaRPr>
           </a:p>
         </p:txBody>
       </p:sp>

</xml_diff>

<commit_message>
changed structure of the poster
</commit_message>
<xml_diff>
--- a/papers/UseR_2014_poster.pptx
+++ b/papers/UseR_2014_poster.pptx
@@ -5,13 +5,14 @@
     <p:sldMasterId id="2147483648" r:id="rId1"/>
   </p:sldMasterIdLst>
   <p:notesMasterIdLst>
-    <p:notesMasterId r:id="rId3"/>
+    <p:notesMasterId r:id="rId4"/>
   </p:notesMasterIdLst>
   <p:handoutMasterIdLst>
-    <p:handoutMasterId r:id="rId4"/>
+    <p:handoutMasterId r:id="rId5"/>
   </p:handoutMasterIdLst>
   <p:sldIdLst>
     <p:sldId id="270" r:id="rId2"/>
+    <p:sldId id="271" r:id="rId3"/>
   </p:sldIdLst>
   <p:sldSz cx="30279975" cy="42808525"/>
   <p:notesSz cx="6858000" cy="9144000"/>
@@ -225,7 +226,7 @@
           <a:p>
             <a:fld id="{98710013-9CD6-4924-938E-62F8982C3A00}" type="datetimeFigureOut">
               <a:rPr lang="ko-KR" altLang="en-US" smtClean="0"/>
-              <a:t>2014-06-09</a:t>
+              <a:t>2014-06-12</a:t>
             </a:fld>
             <a:endParaRPr lang="ko-KR" altLang="en-US"/>
           </a:p>
@@ -390,7 +391,7 @@
           <a:p>
             <a:fld id="{9025242E-0E58-427D-AA38-6F327CB7A29E}" type="datetimeFigureOut">
               <a:rPr lang="ko-KR" altLang="en-US" smtClean="0"/>
-              <a:t>2014-06-09</a:t>
+              <a:t>2014-06-12</a:t>
             </a:fld>
             <a:endParaRPr lang="ko-KR" altLang="en-US"/>
           </a:p>
@@ -745,6 +746,93 @@
 </p:notes>
 </file>
 
+<file path=ppt/notesSlides/notesSlide2.xml><?xml version="1.0" encoding="utf-8"?>
+<p:notes xmlns:a="http://schemas.openxmlformats.org/drawingml/2006/main" xmlns:r="http://schemas.openxmlformats.org/officeDocument/2006/relationships" xmlns:p="http://schemas.openxmlformats.org/presentationml/2006/main">
+  <p:cSld>
+    <p:spTree>
+      <p:nvGrpSpPr>
+        <p:cNvPr id="1" name=""/>
+        <p:cNvGrpSpPr/>
+        <p:nvPr/>
+      </p:nvGrpSpPr>
+      <p:grpSpPr>
+        <a:xfrm>
+          <a:off x="0" y="0"/>
+          <a:ext cx="0" cy="0"/>
+          <a:chOff x="0" y="0"/>
+          <a:chExt cx="0" cy="0"/>
+        </a:xfrm>
+      </p:grpSpPr>
+      <p:sp>
+        <p:nvSpPr>
+          <p:cNvPr id="2" name="슬라이드 이미지 개체 틀 1"/>
+          <p:cNvSpPr>
+            <a:spLocks noGrp="1" noRot="1" noChangeAspect="1"/>
+          </p:cNvSpPr>
+          <p:nvPr>
+            <p:ph type="sldImg"/>
+          </p:nvPr>
+        </p:nvSpPr>
+        <p:spPr/>
+      </p:sp>
+      <p:sp>
+        <p:nvSpPr>
+          <p:cNvPr id="3" name="슬라이드 노트 개체 틀 2"/>
+          <p:cNvSpPr>
+            <a:spLocks noGrp="1"/>
+          </p:cNvSpPr>
+          <p:nvPr>
+            <p:ph type="body" idx="1"/>
+          </p:nvPr>
+        </p:nvSpPr>
+        <p:spPr/>
+        <p:txBody>
+          <a:bodyPr/>
+          <a:lstStyle/>
+          <a:p>
+            <a:endParaRPr lang="ko-KR" altLang="en-US" dirty="0">
+              <a:latin typeface="CordiaUPC" pitchFamily="34" charset="-34"/>
+              <a:cs typeface="CordiaUPC" pitchFamily="34" charset="-34"/>
+            </a:endParaRPr>
+          </a:p>
+        </p:txBody>
+      </p:sp>
+      <p:sp>
+        <p:nvSpPr>
+          <p:cNvPr id="4" name="슬라이드 번호 개체 틀 3"/>
+          <p:cNvSpPr>
+            <a:spLocks noGrp="1"/>
+          </p:cNvSpPr>
+          <p:nvPr>
+            <p:ph type="sldNum" sz="quarter" idx="10"/>
+          </p:nvPr>
+        </p:nvSpPr>
+        <p:spPr/>
+        <p:txBody>
+          <a:bodyPr/>
+          <a:lstStyle/>
+          <a:p>
+            <a:fld id="{A0DB892E-B8EB-4B5E-9F6C-B66DBD7E19F8}" type="slidenum">
+              <a:rPr lang="ko-KR" altLang="en-US" smtClean="0"/>
+              <a:t>2</a:t>
+            </a:fld>
+            <a:endParaRPr lang="ko-KR" altLang="en-US"/>
+          </a:p>
+        </p:txBody>
+      </p:sp>
+    </p:spTree>
+    <p:extLst>
+      <p:ext uri="{BB962C8B-B14F-4D97-AF65-F5344CB8AC3E}">
+        <p14:creationId xmlns:p14="http://schemas.microsoft.com/office/powerpoint/2010/main" val="2361006940"/>
+      </p:ext>
+    </p:extLst>
+  </p:cSld>
+  <p:clrMapOvr>
+    <a:masterClrMapping/>
+  </p:clrMapOvr>
+</p:notes>
+</file>
+
 <file path=ppt/slideLayouts/slideLayout1.xml><?xml version="1.0" encoding="utf-8"?>
 <p:sldLayout xmlns:a="http://schemas.openxmlformats.org/drawingml/2006/main" xmlns:r="http://schemas.openxmlformats.org/officeDocument/2006/relationships" xmlns:p="http://schemas.openxmlformats.org/presentationml/2006/main" type="title" preserve="1">
   <p:cSld name="제목 슬라이드">
@@ -926,7 +1014,7 @@
           <a:p>
             <a:fld id="{E059B02A-7401-45FD-B5BB-7C11F2C0056C}" type="datetimeFigureOut">
               <a:rPr lang="ko-KR" altLang="en-US" smtClean="0"/>
-              <a:t>2014-06-09</a:t>
+              <a:t>2014-06-12</a:t>
             </a:fld>
             <a:endParaRPr lang="ko-KR" altLang="en-US"/>
           </a:p>
@@ -1096,7 +1184,7 @@
           <a:p>
             <a:fld id="{E059B02A-7401-45FD-B5BB-7C11F2C0056C}" type="datetimeFigureOut">
               <a:rPr lang="ko-KR" altLang="en-US" smtClean="0"/>
-              <a:t>2014-06-09</a:t>
+              <a:t>2014-06-12</a:t>
             </a:fld>
             <a:endParaRPr lang="ko-KR" altLang="en-US"/>
           </a:p>
@@ -1276,7 +1364,7 @@
           <a:p>
             <a:fld id="{E059B02A-7401-45FD-B5BB-7C11F2C0056C}" type="datetimeFigureOut">
               <a:rPr lang="ko-KR" altLang="en-US" smtClean="0"/>
-              <a:t>2014-06-09</a:t>
+              <a:t>2014-06-12</a:t>
             </a:fld>
             <a:endParaRPr lang="ko-KR" altLang="en-US"/>
           </a:p>
@@ -1446,7 +1534,7 @@
           <a:p>
             <a:fld id="{E059B02A-7401-45FD-B5BB-7C11F2C0056C}" type="datetimeFigureOut">
               <a:rPr lang="ko-KR" altLang="en-US" smtClean="0"/>
-              <a:t>2014-06-09</a:t>
+              <a:t>2014-06-12</a:t>
             </a:fld>
             <a:endParaRPr lang="ko-KR" altLang="en-US"/>
           </a:p>
@@ -1692,7 +1780,7 @@
           <a:p>
             <a:fld id="{E059B02A-7401-45FD-B5BB-7C11F2C0056C}" type="datetimeFigureOut">
               <a:rPr lang="ko-KR" altLang="en-US" smtClean="0"/>
-              <a:t>2014-06-09</a:t>
+              <a:t>2014-06-12</a:t>
             </a:fld>
             <a:endParaRPr lang="ko-KR" altLang="en-US"/>
           </a:p>
@@ -1980,7 +2068,7 @@
           <a:p>
             <a:fld id="{E059B02A-7401-45FD-B5BB-7C11F2C0056C}" type="datetimeFigureOut">
               <a:rPr lang="ko-KR" altLang="en-US" smtClean="0"/>
-              <a:t>2014-06-09</a:t>
+              <a:t>2014-06-12</a:t>
             </a:fld>
             <a:endParaRPr lang="ko-KR" altLang="en-US"/>
           </a:p>
@@ -2402,7 +2490,7 @@
           <a:p>
             <a:fld id="{E059B02A-7401-45FD-B5BB-7C11F2C0056C}" type="datetimeFigureOut">
               <a:rPr lang="ko-KR" altLang="en-US" smtClean="0"/>
-              <a:t>2014-06-09</a:t>
+              <a:t>2014-06-12</a:t>
             </a:fld>
             <a:endParaRPr lang="ko-KR" altLang="en-US"/>
           </a:p>
@@ -2520,7 +2608,7 @@
           <a:p>
             <a:fld id="{E059B02A-7401-45FD-B5BB-7C11F2C0056C}" type="datetimeFigureOut">
               <a:rPr lang="ko-KR" altLang="en-US" smtClean="0"/>
-              <a:t>2014-06-09</a:t>
+              <a:t>2014-06-12</a:t>
             </a:fld>
             <a:endParaRPr lang="ko-KR" altLang="en-US"/>
           </a:p>
@@ -2615,7 +2703,7 @@
           <a:p>
             <a:fld id="{E059B02A-7401-45FD-B5BB-7C11F2C0056C}" type="datetimeFigureOut">
               <a:rPr lang="ko-KR" altLang="en-US" smtClean="0"/>
-              <a:t>2014-06-09</a:t>
+              <a:t>2014-06-12</a:t>
             </a:fld>
             <a:endParaRPr lang="ko-KR" altLang="en-US"/>
           </a:p>
@@ -2892,7 +2980,7 @@
           <a:p>
             <a:fld id="{E059B02A-7401-45FD-B5BB-7C11F2C0056C}" type="datetimeFigureOut">
               <a:rPr lang="ko-KR" altLang="en-US" smtClean="0"/>
-              <a:t>2014-06-09</a:t>
+              <a:t>2014-06-12</a:t>
             </a:fld>
             <a:endParaRPr lang="ko-KR" altLang="en-US"/>
           </a:p>
@@ -3145,7 +3233,7 @@
           <a:p>
             <a:fld id="{E059B02A-7401-45FD-B5BB-7C11F2C0056C}" type="datetimeFigureOut">
               <a:rPr lang="ko-KR" altLang="en-US" smtClean="0"/>
-              <a:t>2014-06-09</a:t>
+              <a:t>2014-06-12</a:t>
             </a:fld>
             <a:endParaRPr lang="ko-KR" altLang="en-US"/>
           </a:p>
@@ -3358,7 +3446,7 @@
           <a:p>
             <a:fld id="{E059B02A-7401-45FD-B5BB-7C11F2C0056C}" type="datetimeFigureOut">
               <a:rPr lang="ko-KR" altLang="en-US" smtClean="0"/>
-              <a:t>2014-06-09</a:t>
+              <a:t>2014-06-12</a:t>
             </a:fld>
             <a:endParaRPr lang="ko-KR" altLang="en-US"/>
           </a:p>
@@ -3798,7 +3886,7 @@
         <p:spPr>
           <a:xfrm>
             <a:off x="306340" y="6502409"/>
-            <a:ext cx="14443244" cy="14988719"/>
+            <a:ext cx="14443244" cy="9571851"/>
           </a:xfrm>
           <a:prstGeom prst="rect">
             <a:avLst/>
@@ -3838,351 +3926,140 @@
           <a:p>
             <a:pPr algn="just"/>
             <a:r>
+              <a:rPr lang="en-US" altLang="ko-KR" sz="4400" dirty="0">
+                <a:latin typeface="Times New Roman" panose="02020603050405020304" pitchFamily="18" charset="0"/>
+                <a:cs typeface="Times New Roman" panose="02020603050405020304" pitchFamily="18" charset="0"/>
+              </a:rPr>
+              <a:t>This poster presents an overview of R Interactive Graphics via </a:t>
+            </a:r>
+            <a:r>
+              <a:rPr lang="en-US" altLang="ko-KR" sz="4400" dirty="0" err="1">
+                <a:latin typeface="Times New Roman" panose="02020603050405020304" pitchFamily="18" charset="0"/>
+                <a:cs typeface="Times New Roman" panose="02020603050405020304" pitchFamily="18" charset="0"/>
+              </a:rPr>
+              <a:t>HTml</a:t>
+            </a:r>
+            <a:r>
+              <a:rPr lang="en-US" altLang="ko-KR" sz="4400" dirty="0">
+                <a:latin typeface="Times New Roman" panose="02020603050405020304" pitchFamily="18" charset="0"/>
+                <a:cs typeface="Times New Roman" panose="02020603050405020304" pitchFamily="18" charset="0"/>
+              </a:rPr>
+              <a:t> (RIGHT) and the JavaScript data structure that perfectly enables efficient linked </a:t>
+            </a:r>
+            <a:r>
               <a:rPr lang="en-US" altLang="ko-KR" sz="4400" dirty="0" smtClean="0">
                 <a:latin typeface="Times New Roman" panose="02020603050405020304" pitchFamily="18" charset="0"/>
                 <a:cs typeface="Times New Roman" panose="02020603050405020304" pitchFamily="18" charset="0"/>
               </a:rPr>
-              <a:t>Interactive </a:t>
+              <a:t>graphics with interactivity.</a:t>
+            </a:r>
+          </a:p>
+          <a:p>
+            <a:pPr algn="just"/>
+            <a:r>
+              <a:rPr lang="en-US" altLang="ko-KR" sz="4400" dirty="0" smtClean="0">
+                <a:latin typeface="Times New Roman" panose="02020603050405020304" pitchFamily="18" charset="0"/>
+                <a:cs typeface="Times New Roman" panose="02020603050405020304" pitchFamily="18" charset="0"/>
+              </a:rPr>
+              <a:t>RIGHT </a:t>
+            </a:r>
+            <a:r>
+              <a:rPr lang="en-US" altLang="ko-KR" sz="4400" dirty="0" smtClean="0">
+                <a:latin typeface="Times New Roman" panose="02020603050405020304" pitchFamily="18" charset="0"/>
+                <a:cs typeface="Times New Roman" panose="02020603050405020304" pitchFamily="18" charset="0"/>
+              </a:rPr>
+              <a:t>is the first package that implements linked graphs using HTML canvas and </a:t>
+            </a:r>
+            <a:r>
+              <a:rPr lang="en-US" altLang="ko-KR" sz="4400" dirty="0" smtClean="0">
+                <a:latin typeface="Times New Roman" panose="02020603050405020304" pitchFamily="18" charset="0"/>
+                <a:cs typeface="Times New Roman" panose="02020603050405020304" pitchFamily="18" charset="0"/>
+              </a:rPr>
+              <a:t>JavaScript and </a:t>
+            </a:r>
+            <a:r>
+              <a:rPr lang="en-US" altLang="ko-KR" sz="4400" dirty="0" smtClean="0">
+                <a:latin typeface="Times New Roman" panose="02020603050405020304" pitchFamily="18" charset="0"/>
+                <a:cs typeface="Times New Roman" panose="02020603050405020304" pitchFamily="18" charset="0"/>
+              </a:rPr>
+              <a:t>supports </a:t>
             </a:r>
             <a:r>
               <a:rPr lang="en-US" altLang="ko-KR" sz="4400" dirty="0">
                 <a:latin typeface="Times New Roman" panose="02020603050405020304" pitchFamily="18" charset="0"/>
                 <a:cs typeface="Times New Roman" panose="02020603050405020304" pitchFamily="18" charset="0"/>
               </a:rPr>
-              <a:t>data visualization has received broad interest in the </a:t>
-            </a:r>
-            <a:r>
-              <a:rPr lang="en-US" altLang="ko-KR" sz="4400" i="1" dirty="0">
-                <a:latin typeface="Times New Roman" panose="02020603050405020304" pitchFamily="18" charset="0"/>
-                <a:cs typeface="Times New Roman" panose="02020603050405020304" pitchFamily="18" charset="0"/>
-              </a:rPr>
-              <a:t>R</a:t>
+              <a:t>efficient linked graphics that can </a:t>
+            </a:r>
+            <a:r>
+              <a:rPr lang="en-US" altLang="ko-KR" sz="4400" dirty="0" smtClean="0">
+                <a:latin typeface="Times New Roman" panose="02020603050405020304" pitchFamily="18" charset="0"/>
+                <a:cs typeface="Times New Roman" panose="02020603050405020304" pitchFamily="18" charset="0"/>
+              </a:rPr>
+              <a:t>show obvious </a:t>
             </a:r>
             <a:r>
               <a:rPr lang="en-US" altLang="ko-KR" sz="4400" dirty="0">
                 <a:latin typeface="Times New Roman" panose="02020603050405020304" pitchFamily="18" charset="0"/>
                 <a:cs typeface="Times New Roman" panose="02020603050405020304" pitchFamily="18" charset="0"/>
               </a:rPr>
-              <a:t> community due to its obvious benefits over static visualization: more information can be delivered concisely and intuitively by user engagement. As a result, various </a:t>
-            </a:r>
-            <a:r>
-              <a:rPr lang="en-US" altLang="ko-KR" sz="4400" i="1" dirty="0">
-                <a:latin typeface="Times New Roman" panose="02020603050405020304" pitchFamily="18" charset="0"/>
-                <a:cs typeface="Times New Roman" panose="02020603050405020304" pitchFamily="18" charset="0"/>
-              </a:rPr>
-              <a:t>R</a:t>
+              <a:t>relationship between multiple plots using same data. </a:t>
+            </a:r>
+            <a:endParaRPr lang="en-US" altLang="ko-KR" sz="4400" dirty="0" smtClean="0">
+              <a:latin typeface="Times New Roman" panose="02020603050405020304" pitchFamily="18" charset="0"/>
+              <a:cs typeface="Times New Roman" panose="02020603050405020304" pitchFamily="18" charset="0"/>
+            </a:endParaRPr>
+          </a:p>
+          <a:p>
+            <a:pPr algn="just"/>
+            <a:r>
+              <a:rPr lang="en-US" altLang="ko-KR" sz="4400" dirty="0" smtClean="0">
+                <a:latin typeface="Times New Roman" panose="02020603050405020304" pitchFamily="18" charset="0"/>
+                <a:cs typeface="Times New Roman" panose="02020603050405020304" pitchFamily="18" charset="0"/>
+              </a:rPr>
+              <a:t>Also</a:t>
+            </a:r>
+            <a:r>
+              <a:rPr lang="en-US" altLang="ko-KR" sz="4400" dirty="0" smtClean="0">
+                <a:latin typeface="Times New Roman" panose="02020603050405020304" pitchFamily="18" charset="0"/>
+                <a:cs typeface="Times New Roman" panose="02020603050405020304" pitchFamily="18" charset="0"/>
+              </a:rPr>
+              <a:t>, </a:t>
             </a:r>
             <a:r>
               <a:rPr lang="en-US" altLang="ko-KR" sz="4400" dirty="0">
                 <a:latin typeface="Times New Roman" panose="02020603050405020304" pitchFamily="18" charset="0"/>
                 <a:cs typeface="Times New Roman" panose="02020603050405020304" pitchFamily="18" charset="0"/>
               </a:rPr>
-              <a:t> packages supporting single-layer, multi-layer, and linked graphics have been developed, including </a:t>
-            </a:r>
-            <a:r>
-              <a:rPr lang="en-US" altLang="ko-KR" sz="4400" dirty="0" err="1">
-                <a:latin typeface="Times New Roman" panose="02020603050405020304" pitchFamily="18" charset="0"/>
-                <a:cs typeface="Times New Roman" panose="02020603050405020304" pitchFamily="18" charset="0"/>
-              </a:rPr>
-              <a:t>rCharts</a:t>
-            </a:r>
-            <a:r>
-              <a:rPr lang="en-US" altLang="ko-KR" sz="4400" dirty="0">
-                <a:latin typeface="Times New Roman" panose="02020603050405020304" pitchFamily="18" charset="0"/>
-                <a:cs typeface="Times New Roman" panose="02020603050405020304" pitchFamily="18" charset="0"/>
-              </a:rPr>
-              <a:t>, </a:t>
-            </a:r>
-            <a:r>
-              <a:rPr lang="en-US" altLang="ko-KR" sz="4400" dirty="0" err="1">
-                <a:latin typeface="Times New Roman" panose="02020603050405020304" pitchFamily="18" charset="0"/>
-                <a:cs typeface="Times New Roman" panose="02020603050405020304" pitchFamily="18" charset="0"/>
-              </a:rPr>
-              <a:t>iPlots</a:t>
-            </a:r>
-            <a:r>
-              <a:rPr lang="en-US" altLang="ko-KR" sz="4400" dirty="0">
-                <a:latin typeface="Times New Roman" panose="02020603050405020304" pitchFamily="18" charset="0"/>
-                <a:cs typeface="Times New Roman" panose="02020603050405020304" pitchFamily="18" charset="0"/>
-              </a:rPr>
-              <a:t>, </a:t>
-            </a:r>
-            <a:r>
-              <a:rPr lang="en-US" altLang="ko-KR" sz="4400" dirty="0" err="1">
-                <a:latin typeface="Times New Roman" panose="02020603050405020304" pitchFamily="18" charset="0"/>
-                <a:cs typeface="Times New Roman" panose="02020603050405020304" pitchFamily="18" charset="0"/>
-              </a:rPr>
-              <a:t>cranvas</a:t>
-            </a:r>
-            <a:r>
-              <a:rPr lang="en-US" altLang="ko-KR" sz="4400" dirty="0">
-                <a:latin typeface="Times New Roman" panose="02020603050405020304" pitchFamily="18" charset="0"/>
-                <a:cs typeface="Times New Roman" panose="02020603050405020304" pitchFamily="18" charset="0"/>
-              </a:rPr>
-              <a:t>, </a:t>
-            </a:r>
-            <a:r>
-              <a:rPr lang="en-US" altLang="ko-KR" sz="4400" dirty="0" err="1">
-                <a:latin typeface="Times New Roman" panose="02020603050405020304" pitchFamily="18" charset="0"/>
-                <a:cs typeface="Times New Roman" panose="02020603050405020304" pitchFamily="18" charset="0"/>
-              </a:rPr>
-              <a:t>ggvis</a:t>
-            </a:r>
-            <a:r>
-              <a:rPr lang="en-US" altLang="ko-KR" sz="4400" dirty="0">
-                <a:latin typeface="Times New Roman" panose="02020603050405020304" pitchFamily="18" charset="0"/>
-                <a:cs typeface="Times New Roman" panose="02020603050405020304" pitchFamily="18" charset="0"/>
-              </a:rPr>
-              <a:t>, </a:t>
-            </a:r>
-            <a:r>
-              <a:rPr lang="en-US" altLang="ko-KR" sz="4400" dirty="0" err="1">
-                <a:latin typeface="Times New Roman" panose="02020603050405020304" pitchFamily="18" charset="0"/>
-                <a:cs typeface="Times New Roman" panose="02020603050405020304" pitchFamily="18" charset="0"/>
-              </a:rPr>
-              <a:t>animint</a:t>
-            </a:r>
-            <a:r>
-              <a:rPr lang="en-US" altLang="ko-KR" sz="4400" dirty="0">
-                <a:latin typeface="Times New Roman" panose="02020603050405020304" pitchFamily="18" charset="0"/>
-                <a:cs typeface="Times New Roman" panose="02020603050405020304" pitchFamily="18" charset="0"/>
-              </a:rPr>
-              <a:t> and </a:t>
-            </a:r>
-            <a:r>
-              <a:rPr lang="en-US" altLang="ko-KR" sz="4400" dirty="0" err="1" smtClean="0">
-                <a:latin typeface="Times New Roman" panose="02020603050405020304" pitchFamily="18" charset="0"/>
-                <a:cs typeface="Times New Roman" panose="02020603050405020304" pitchFamily="18" charset="0"/>
-              </a:rPr>
-              <a:t>googleVis</a:t>
+              <a:t>HTML canvas and JavaScript make it possible to deliver the visualization to various platforms, including mobile devices, since they are standard web technologies supported by most modern web </a:t>
             </a:r>
             <a:r>
               <a:rPr lang="en-US" altLang="ko-KR" sz="4400" dirty="0" smtClean="0">
                 <a:latin typeface="Times New Roman" panose="02020603050405020304" pitchFamily="18" charset="0"/>
                 <a:cs typeface="Times New Roman" panose="02020603050405020304" pitchFamily="18" charset="0"/>
               </a:rPr>
-              <a:t>. However, supporting efficient linked graphics that can help answer obvious relationship between multiple plots using same data is still left on the table since it is hard to provide linked graphs fully without specific event structure and event-driven platform. This poster presents an overview of R Interactive Graphics via </a:t>
-            </a:r>
-            <a:r>
-              <a:rPr lang="en-US" altLang="ko-KR" sz="4400" dirty="0" err="1" smtClean="0">
-                <a:latin typeface="Times New Roman" panose="02020603050405020304" pitchFamily="18" charset="0"/>
-                <a:cs typeface="Times New Roman" panose="02020603050405020304" pitchFamily="18" charset="0"/>
-              </a:rPr>
-              <a:t>HTml</a:t>
-            </a:r>
+              <a:t>browsers. </a:t>
+            </a:r>
+            <a:endParaRPr lang="en-US" altLang="ko-KR" sz="4400" dirty="0">
+              <a:latin typeface="Times New Roman" panose="02020603050405020304" pitchFamily="18" charset="0"/>
+              <a:cs typeface="Times New Roman" panose="02020603050405020304" pitchFamily="18" charset="0"/>
+            </a:endParaRPr>
+          </a:p>
+          <a:p>
+            <a:pPr algn="just"/>
             <a:r>
               <a:rPr lang="en-US" altLang="ko-KR" sz="4400" dirty="0" smtClean="0">
                 <a:latin typeface="Times New Roman" panose="02020603050405020304" pitchFamily="18" charset="0"/>
                 <a:cs typeface="Times New Roman" panose="02020603050405020304" pitchFamily="18" charset="0"/>
               </a:rPr>
-              <a:t> (RIGHT) and the JavaScript data structure that </a:t>
-            </a:r>
-            <a:r>
-              <a:rPr lang="en-US" altLang="ko-KR" sz="4400" dirty="0">
-                <a:latin typeface="Times New Roman" panose="02020603050405020304" pitchFamily="18" charset="0"/>
-                <a:cs typeface="Times New Roman" panose="02020603050405020304" pitchFamily="18" charset="0"/>
-              </a:rPr>
-              <a:t>perfectly</a:t>
-            </a:r>
-            <a:r>
-              <a:rPr lang="en-US" altLang="ko-KR" sz="4400" dirty="0" smtClean="0">
-                <a:latin typeface="Times New Roman" panose="02020603050405020304" pitchFamily="18" charset="0"/>
-                <a:cs typeface="Times New Roman" panose="02020603050405020304" pitchFamily="18" charset="0"/>
-              </a:rPr>
-              <a:t> enables efficient linked graphics. RIGHT is the first package that implements linked graphs using HTML canvas and JavaScript. Also, </a:t>
-            </a:r>
-            <a:r>
-              <a:rPr lang="en-US" altLang="ko-KR" sz="4400" dirty="0">
-                <a:latin typeface="Times New Roman" panose="02020603050405020304" pitchFamily="18" charset="0"/>
-                <a:cs typeface="Times New Roman" panose="02020603050405020304" pitchFamily="18" charset="0"/>
-              </a:rPr>
-              <a:t>HTML canvas and JavaScript make it possible to deliver the visualization to various platforms, including mobile devices, since they are standard web technologies supported by most modern web </a:t>
-            </a:r>
-            <a:r>
-              <a:rPr lang="en-US" altLang="ko-KR" sz="4400" dirty="0" smtClean="0">
-                <a:latin typeface="Times New Roman" panose="02020603050405020304" pitchFamily="18" charset="0"/>
-                <a:cs typeface="Times New Roman" panose="02020603050405020304" pitchFamily="18" charset="0"/>
-              </a:rPr>
-              <a:t>browsers. </a:t>
-            </a:r>
-            <a:r>
-              <a:rPr lang="en-US" altLang="ko-KR" sz="4400" dirty="0">
-                <a:latin typeface="Times New Roman" panose="02020603050405020304" pitchFamily="18" charset="0"/>
-                <a:cs typeface="Times New Roman" panose="02020603050405020304" pitchFamily="18" charset="0"/>
-              </a:rPr>
-              <a:t>This approach can also benefit from the improvement of JavaScript performance every generation, driven by various web applications with ever increasing complexity and sophistication.</a:t>
-            </a:r>
-            <a:endParaRPr lang="ko-KR" altLang="en-US" sz="4400" dirty="0">
-              <a:latin typeface="Times New Roman" pitchFamily="18" charset="0"/>
-              <a:cs typeface="Times New Roman" pitchFamily="18" charset="0"/>
-            </a:endParaRPr>
-          </a:p>
-        </p:txBody>
-      </p:sp>
-      <p:sp>
-        <p:nvSpPr>
-          <p:cNvPr id="12" name="Rounded Rectangle 1691"/>
-          <p:cNvSpPr/>
-          <p:nvPr/>
-        </p:nvSpPr>
-        <p:spPr bwMode="auto">
-          <a:xfrm>
-            <a:off x="15013238" y="5418991"/>
-            <a:ext cx="5760640" cy="1016182"/>
-          </a:xfrm>
-          <a:prstGeom prst="roundRect">
-            <a:avLst/>
-          </a:prstGeom>
-          <a:ln>
-            <a:headEnd type="none" w="med" len="med"/>
-            <a:tailEnd type="none" w="med" len="med"/>
-          </a:ln>
-        </p:spPr>
-        <p:style>
-          <a:lnRef idx="1">
-            <a:schemeClr val="accent3"/>
-          </a:lnRef>
-          <a:fillRef idx="3">
-            <a:schemeClr val="accent3"/>
-          </a:fillRef>
-          <a:effectRef idx="2">
-            <a:schemeClr val="accent3"/>
-          </a:effectRef>
-          <a:fontRef idx="minor">
-            <a:schemeClr val="lt1"/>
-          </a:fontRef>
-        </p:style>
-        <p:txBody>
-          <a:bodyPr anchor="ctr" anchorCtr="1">
-            <a:normAutofit fontScale="92500" lnSpcReduction="10000"/>
-          </a:bodyPr>
-          <a:lstStyle/>
-          <a:p>
-            <a:pPr algn="ctr">
-              <a:defRPr/>
-            </a:pPr>
-            <a:r>
-              <a:rPr lang="en-US" sz="6000" b="1" dirty="0" smtClean="0">
-                <a:latin typeface="Times New Roman" pitchFamily="18" charset="0"/>
-                <a:cs typeface="Times New Roman" pitchFamily="18" charset="0"/>
-              </a:rPr>
-              <a:t>Event Structure</a:t>
-            </a:r>
-            <a:endParaRPr lang="en-US" sz="6000" b="1" dirty="0">
-              <a:latin typeface="Times New Roman" pitchFamily="18" charset="0"/>
-              <a:cs typeface="Times New Roman" pitchFamily="18" charset="0"/>
-            </a:endParaRPr>
-          </a:p>
-        </p:txBody>
-      </p:sp>
-      <p:sp>
-        <p:nvSpPr>
-          <p:cNvPr id="14" name="Rounded Rectangle 1691"/>
-          <p:cNvSpPr/>
-          <p:nvPr/>
-        </p:nvSpPr>
-        <p:spPr bwMode="auto">
-          <a:xfrm>
-            <a:off x="288000" y="21693724"/>
-            <a:ext cx="5760640" cy="1016182"/>
-          </a:xfrm>
-          <a:prstGeom prst="roundRect">
-            <a:avLst/>
-          </a:prstGeom>
-          <a:ln>
-            <a:headEnd type="none" w="med" len="med"/>
-            <a:tailEnd type="none" w="med" len="med"/>
-          </a:ln>
-        </p:spPr>
-        <p:style>
-          <a:lnRef idx="1">
-            <a:schemeClr val="accent3"/>
-          </a:lnRef>
-          <a:fillRef idx="3">
-            <a:schemeClr val="accent3"/>
-          </a:fillRef>
-          <a:effectRef idx="2">
-            <a:schemeClr val="accent3"/>
-          </a:effectRef>
-          <a:fontRef idx="minor">
-            <a:schemeClr val="lt1"/>
-          </a:fontRef>
-        </p:style>
-        <p:txBody>
-          <a:bodyPr anchor="ctr" anchorCtr="1">
-            <a:normAutofit fontScale="92500" lnSpcReduction="10000"/>
-          </a:bodyPr>
-          <a:lstStyle/>
-          <a:p>
-            <a:pPr>
-              <a:defRPr/>
-            </a:pPr>
-            <a:r>
-              <a:rPr lang="en-US" sz="6000" b="1" dirty="0" smtClean="0">
-                <a:latin typeface="Times New Roman" pitchFamily="18" charset="0"/>
-                <a:cs typeface="Times New Roman" pitchFamily="18" charset="0"/>
-              </a:rPr>
-              <a:t>Motivation</a:t>
-            </a:r>
-            <a:endParaRPr lang="en-US" sz="6000" b="1" dirty="0">
-              <a:latin typeface="Times New Roman" pitchFamily="18" charset="0"/>
-              <a:cs typeface="Times New Roman" pitchFamily="18" charset="0"/>
-            </a:endParaRPr>
-          </a:p>
-        </p:txBody>
-      </p:sp>
-      <p:sp>
-        <p:nvSpPr>
-          <p:cNvPr id="74" name="Rounded Rectangle 1691"/>
-          <p:cNvSpPr/>
-          <p:nvPr/>
-        </p:nvSpPr>
-        <p:spPr bwMode="auto">
-          <a:xfrm>
-            <a:off x="306338" y="34188218"/>
-            <a:ext cx="5721375" cy="1016182"/>
-          </a:xfrm>
-          <a:prstGeom prst="roundRect">
-            <a:avLst/>
-          </a:prstGeom>
-          <a:ln>
-            <a:headEnd type="none" w="med" len="med"/>
-            <a:tailEnd type="none" w="med" len="med"/>
-          </a:ln>
-        </p:spPr>
-        <p:style>
-          <a:lnRef idx="1">
-            <a:schemeClr val="accent3"/>
-          </a:lnRef>
-          <a:fillRef idx="3">
-            <a:schemeClr val="accent3"/>
-          </a:fillRef>
-          <a:effectRef idx="2">
-            <a:schemeClr val="accent3"/>
-          </a:effectRef>
-          <a:fontRef idx="minor">
-            <a:schemeClr val="lt1"/>
-          </a:fontRef>
-        </p:style>
-        <p:txBody>
-          <a:bodyPr anchor="ctr" anchorCtr="1">
-            <a:normAutofit fontScale="92500" lnSpcReduction="10000"/>
-          </a:bodyPr>
-          <a:lstStyle/>
-          <a:p>
-            <a:pPr algn="ctr">
-              <a:defRPr/>
-            </a:pPr>
-            <a:r>
-              <a:rPr lang="en-US" sz="6000" b="1" dirty="0" smtClean="0">
-                <a:latin typeface="Times New Roman" pitchFamily="18" charset="0"/>
-                <a:cs typeface="Times New Roman" pitchFamily="18" charset="0"/>
-              </a:rPr>
-              <a:t>Supported plots</a:t>
-            </a:r>
-            <a:endParaRPr lang="en-US" sz="6000" b="1" dirty="0">
-              <a:latin typeface="Times New Roman" pitchFamily="18" charset="0"/>
-              <a:cs typeface="Times New Roman" pitchFamily="18" charset="0"/>
+              <a:t>The development of this project has been funded by Google Summer of Code - R project (GSOC-r) from 2013.</a:t>
+            </a:r>
+          </a:p>
+          <a:p>
+            <a:pPr algn="just"/>
+            <a:endParaRPr lang="en-US" altLang="ko-KR" sz="4400" dirty="0">
+              <a:latin typeface="Times New Roman" panose="02020603050405020304" pitchFamily="18" charset="0"/>
+              <a:cs typeface="Times New Roman" panose="02020603050405020304" pitchFamily="18" charset="0"/>
             </a:endParaRPr>
           </a:p>
         </p:txBody>
@@ -4607,14 +4484,126 @@
       </p:sp>
       <p:sp>
         <p:nvSpPr>
-          <p:cNvPr id="133" name="직사각형 132"/>
+          <p:cNvPr id="129" name="Rounded Rectangle 1691"/>
           <p:cNvSpPr/>
           <p:nvPr/>
         </p:nvSpPr>
+        <p:spPr bwMode="auto">
+          <a:xfrm>
+            <a:off x="306338" y="34958432"/>
+            <a:ext cx="5760640" cy="1016182"/>
+          </a:xfrm>
+          <a:prstGeom prst="roundRect">
+            <a:avLst/>
+          </a:prstGeom>
+          <a:ln>
+            <a:headEnd type="none" w="med" len="med"/>
+            <a:tailEnd type="none" w="med" len="med"/>
+          </a:ln>
+        </p:spPr>
+        <p:style>
+          <a:lnRef idx="1">
+            <a:schemeClr val="accent3"/>
+          </a:lnRef>
+          <a:fillRef idx="3">
+            <a:schemeClr val="accent3"/>
+          </a:fillRef>
+          <a:effectRef idx="2">
+            <a:schemeClr val="accent3"/>
+          </a:effectRef>
+          <a:fontRef idx="minor">
+            <a:schemeClr val="lt1"/>
+          </a:fontRef>
+        </p:style>
+        <p:txBody>
+          <a:bodyPr anchor="ctr" anchorCtr="1">
+            <a:normAutofit fontScale="92500" lnSpcReduction="10000"/>
+          </a:bodyPr>
+          <a:lstStyle/>
+          <a:p>
+            <a:pPr>
+              <a:defRPr/>
+            </a:pPr>
+            <a:r>
+              <a:rPr lang="en-US" sz="6000" b="1" dirty="0" smtClean="0">
+                <a:latin typeface="Times New Roman" pitchFamily="18" charset="0"/>
+                <a:cs typeface="Times New Roman" pitchFamily="18" charset="0"/>
+              </a:rPr>
+              <a:t>How to run?</a:t>
+            </a:r>
+            <a:endParaRPr lang="en-US" sz="6000" b="1" dirty="0">
+              <a:latin typeface="Times New Roman" pitchFamily="18" charset="0"/>
+              <a:cs typeface="Times New Roman" pitchFamily="18" charset="0"/>
+            </a:endParaRPr>
+          </a:p>
+        </p:txBody>
+      </p:sp>
+      <p:sp>
+        <p:nvSpPr>
+          <p:cNvPr id="14" name="Rounded Rectangle 1691"/>
+          <p:cNvSpPr/>
+          <p:nvPr/>
+        </p:nvSpPr>
+        <p:spPr bwMode="auto">
+          <a:xfrm>
+            <a:off x="15428594" y="5418991"/>
+            <a:ext cx="5760640" cy="1016182"/>
+          </a:xfrm>
+          <a:prstGeom prst="roundRect">
+            <a:avLst/>
+          </a:prstGeom>
+          <a:ln>
+            <a:headEnd type="none" w="med" len="med"/>
+            <a:tailEnd type="none" w="med" len="med"/>
+          </a:ln>
+        </p:spPr>
+        <p:style>
+          <a:lnRef idx="1">
+            <a:schemeClr val="accent3"/>
+          </a:lnRef>
+          <a:fillRef idx="3">
+            <a:schemeClr val="accent3"/>
+          </a:fillRef>
+          <a:effectRef idx="2">
+            <a:schemeClr val="accent3"/>
+          </a:effectRef>
+          <a:fontRef idx="minor">
+            <a:schemeClr val="lt1"/>
+          </a:fontRef>
+        </p:style>
+        <p:txBody>
+          <a:bodyPr anchor="ctr" anchorCtr="1">
+            <a:normAutofit fontScale="92500" lnSpcReduction="10000"/>
+          </a:bodyPr>
+          <a:lstStyle/>
+          <a:p>
+            <a:pPr>
+              <a:defRPr/>
+            </a:pPr>
+            <a:r>
+              <a:rPr lang="en-US" sz="6000" b="1" dirty="0" smtClean="0">
+                <a:latin typeface="Times New Roman" pitchFamily="18" charset="0"/>
+                <a:cs typeface="Times New Roman" pitchFamily="18" charset="0"/>
+              </a:rPr>
+              <a:t>Motivation</a:t>
+            </a:r>
+            <a:endParaRPr lang="en-US" sz="6000" b="1" dirty="0">
+              <a:latin typeface="Times New Roman" pitchFamily="18" charset="0"/>
+              <a:cs typeface="Times New Roman" pitchFamily="18" charset="0"/>
+            </a:endParaRPr>
+          </a:p>
+        </p:txBody>
+      </p:sp>
+      <p:sp>
+        <p:nvSpPr>
+          <p:cNvPr id="115" name="직사각형 114"/>
+          <p:cNvSpPr/>
+          <p:nvPr/>
+        </p:nvSpPr>
         <p:spPr>
           <a:xfrm>
-            <a:off x="15027176" y="6520897"/>
-            <a:ext cx="14897443" cy="17478301"/>
+            <a:off x="15454905" y="6520923"/>
+            <a:ext cx="14435273" cy="9553338"/>
           </a:xfrm>
           <a:prstGeom prst="rect">
             <a:avLst/>
@@ -4662,16 +4651,245 @@
           </a:p>
         </p:txBody>
       </p:sp>
-      <p:sp>
-        <p:nvSpPr>
-          <p:cNvPr id="126" name="직사각형 125"/>
+      <p:pic>
+        <p:nvPicPr>
+          <p:cNvPr id="19" name="그림 18"/>
+          <p:cNvPicPr>
+            <a:picLocks noChangeAspect="1"/>
+          </p:cNvPicPr>
+          <p:nvPr/>
+        </p:nvPicPr>
+        <p:blipFill>
+          <a:blip r:embed="rId3"/>
+          <a:stretch>
+            <a:fillRect/>
+          </a:stretch>
+        </p:blipFill>
+        <p:spPr>
+          <a:xfrm>
+            <a:off x="22084422" y="7289787"/>
+            <a:ext cx="7737527" cy="3510470"/>
+          </a:xfrm>
+          <a:prstGeom prst="rect">
+            <a:avLst/>
+          </a:prstGeom>
+        </p:spPr>
+      </p:pic>
+      <p:sp>
+        <p:nvSpPr>
+          <p:cNvPr id="151" name="TextBox 150"/>
+          <p:cNvSpPr txBox="1"/>
+          <p:nvPr/>
+        </p:nvSpPr>
+        <p:spPr>
+          <a:xfrm>
+            <a:off x="15537689" y="6583347"/>
+            <a:ext cx="14352489" cy="769441"/>
+          </a:xfrm>
+          <a:prstGeom prst="rect">
+            <a:avLst/>
+          </a:prstGeom>
+        </p:spPr>
+        <p:txBody>
+          <a:bodyPr wrap="square" rtlCol="0">
+            <a:spAutoFit/>
+          </a:bodyPr>
+          <a:lstStyle/>
+          <a:p>
+            <a:pPr algn="just"/>
+            <a:r>
+              <a:rPr lang="en-US" altLang="ko-KR" sz="4400" b="1" dirty="0" smtClean="0">
+                <a:latin typeface="Times New Roman" panose="02020603050405020304" pitchFamily="18" charset="0"/>
+                <a:cs typeface="Times New Roman" panose="02020603050405020304" pitchFamily="18" charset="0"/>
+              </a:rPr>
+              <a:t>Why linked graphs?</a:t>
+            </a:r>
+          </a:p>
+        </p:txBody>
+      </p:sp>
+      <p:sp>
+        <p:nvSpPr>
+          <p:cNvPr id="152" name="TextBox 151"/>
+          <p:cNvSpPr txBox="1"/>
+          <p:nvPr/>
+        </p:nvSpPr>
+        <p:spPr>
+          <a:xfrm>
+            <a:off x="15537689" y="7189953"/>
+            <a:ext cx="14352489" cy="8894743"/>
+          </a:xfrm>
+          <a:prstGeom prst="rect">
+            <a:avLst/>
+          </a:prstGeom>
+        </p:spPr>
+        <p:txBody>
+          <a:bodyPr wrap="square" rtlCol="0">
+            <a:spAutoFit/>
+          </a:bodyPr>
+          <a:lstStyle/>
+          <a:p>
+            <a:r>
+              <a:rPr lang="en-US" altLang="ko-KR" sz="4400" dirty="0" smtClean="0">
+                <a:latin typeface="Times New Roman" panose="02020603050405020304" pitchFamily="18" charset="0"/>
+                <a:cs typeface="Times New Roman" panose="02020603050405020304" pitchFamily="18" charset="0"/>
+              </a:rPr>
+              <a:t>Link between two graphs </a:t>
+            </a:r>
+            <a:br>
+              <a:rPr lang="en-US" altLang="ko-KR" sz="4400" dirty="0" smtClean="0">
+                <a:latin typeface="Times New Roman" panose="02020603050405020304" pitchFamily="18" charset="0"/>
+                <a:cs typeface="Times New Roman" panose="02020603050405020304" pitchFamily="18" charset="0"/>
+              </a:rPr>
+            </a:br>
+            <a:r>
+              <a:rPr lang="en-US" altLang="ko-KR" sz="4400" dirty="0" smtClean="0">
+                <a:latin typeface="Times New Roman" panose="02020603050405020304" pitchFamily="18" charset="0"/>
+                <a:cs typeface="Times New Roman" panose="02020603050405020304" pitchFamily="18" charset="0"/>
+              </a:rPr>
+              <a:t>can provide users with  </a:t>
+            </a:r>
+            <a:br>
+              <a:rPr lang="en-US" altLang="ko-KR" sz="4400" dirty="0" smtClean="0">
+                <a:latin typeface="Times New Roman" panose="02020603050405020304" pitchFamily="18" charset="0"/>
+                <a:cs typeface="Times New Roman" panose="02020603050405020304" pitchFamily="18" charset="0"/>
+              </a:rPr>
+            </a:br>
+            <a:r>
+              <a:rPr lang="en-US" altLang="ko-KR" sz="4400" dirty="0" smtClean="0">
+                <a:latin typeface="Times New Roman" panose="02020603050405020304" pitchFamily="18" charset="0"/>
+                <a:cs typeface="Times New Roman" panose="02020603050405020304" pitchFamily="18" charset="0"/>
+              </a:rPr>
+              <a:t>deep insight when </a:t>
+            </a:r>
+            <a:r>
+              <a:rPr lang="en-US" altLang="ko-KR" sz="4400" dirty="0" err="1" smtClean="0">
+                <a:latin typeface="Times New Roman" panose="02020603050405020304" pitchFamily="18" charset="0"/>
+                <a:cs typeface="Times New Roman" panose="02020603050405020304" pitchFamily="18" charset="0"/>
+              </a:rPr>
+              <a:t>analyz</a:t>
+            </a:r>
+            <a:r>
+              <a:rPr lang="en-US" altLang="ko-KR" sz="4400" dirty="0" smtClean="0">
+                <a:latin typeface="Times New Roman" panose="02020603050405020304" pitchFamily="18" charset="0"/>
+                <a:cs typeface="Times New Roman" panose="02020603050405020304" pitchFamily="18" charset="0"/>
+              </a:rPr>
+              <a:t>-</a:t>
+            </a:r>
+            <a:br>
+              <a:rPr lang="en-US" altLang="ko-KR" sz="4400" dirty="0" smtClean="0">
+                <a:latin typeface="Times New Roman" panose="02020603050405020304" pitchFamily="18" charset="0"/>
+                <a:cs typeface="Times New Roman" panose="02020603050405020304" pitchFamily="18" charset="0"/>
+              </a:rPr>
+            </a:br>
+            <a:r>
+              <a:rPr lang="en-US" altLang="ko-KR" sz="4400" dirty="0" err="1" smtClean="0">
+                <a:latin typeface="Times New Roman" panose="02020603050405020304" pitchFamily="18" charset="0"/>
+                <a:cs typeface="Times New Roman" panose="02020603050405020304" pitchFamily="18" charset="0"/>
+              </a:rPr>
+              <a:t>ing</a:t>
+            </a:r>
+            <a:r>
+              <a:rPr lang="en-US" altLang="ko-KR" sz="4400" dirty="0" smtClean="0">
+                <a:latin typeface="Times New Roman" panose="02020603050405020304" pitchFamily="18" charset="0"/>
+                <a:cs typeface="Times New Roman" panose="02020603050405020304" pitchFamily="18" charset="0"/>
+              </a:rPr>
+              <a:t> the large set of data.</a:t>
+            </a:r>
+            <a:br>
+              <a:rPr lang="en-US" altLang="ko-KR" sz="4400" dirty="0" smtClean="0">
+                <a:latin typeface="Times New Roman" panose="02020603050405020304" pitchFamily="18" charset="0"/>
+                <a:cs typeface="Times New Roman" panose="02020603050405020304" pitchFamily="18" charset="0"/>
+              </a:rPr>
+            </a:br>
+            <a:r>
+              <a:rPr lang="en-US" altLang="ko-KR" sz="4400" dirty="0" smtClean="0">
+                <a:latin typeface="Times New Roman" panose="02020603050405020304" pitchFamily="18" charset="0"/>
+                <a:cs typeface="Times New Roman" panose="02020603050405020304" pitchFamily="18" charset="0"/>
+              </a:rPr>
+              <a:t>By just clicking or dragging </a:t>
+            </a:r>
+            <a:br>
+              <a:rPr lang="en-US" altLang="ko-KR" sz="4400" dirty="0" smtClean="0">
+                <a:latin typeface="Times New Roman" panose="02020603050405020304" pitchFamily="18" charset="0"/>
+                <a:cs typeface="Times New Roman" panose="02020603050405020304" pitchFamily="18" charset="0"/>
+              </a:rPr>
+            </a:br>
+            <a:r>
+              <a:rPr lang="en-US" altLang="ko-KR" sz="4400" dirty="0" smtClean="0">
+                <a:latin typeface="Times New Roman" panose="02020603050405020304" pitchFamily="18" charset="0"/>
+                <a:cs typeface="Times New Roman" panose="02020603050405020304" pitchFamily="18" charset="0"/>
+              </a:rPr>
+              <a:t>nodes from one graph would show the related nodes of another graph. Because it is common that there are more than 2 fields on one data in many research areas, drawing many graphs of same data can be a critical role for users by helping them to predict and analyze the tendency of data better. Therefore, the bigger the size of data,  the more time it takes for users to find connected node and relationship between graphs so that it can be a bottleneck of making a decision.</a:t>
+            </a:r>
+          </a:p>
+        </p:txBody>
+      </p:sp>
+      <p:sp>
+        <p:nvSpPr>
+          <p:cNvPr id="12" name="Rounded Rectangle 1691"/>
           <p:cNvSpPr/>
           <p:nvPr/>
         </p:nvSpPr>
+        <p:spPr bwMode="auto">
+          <a:xfrm>
+            <a:off x="306338" y="16289551"/>
+            <a:ext cx="5760640" cy="1016182"/>
+          </a:xfrm>
+          <a:prstGeom prst="roundRect">
+            <a:avLst/>
+          </a:prstGeom>
+          <a:ln>
+            <a:headEnd type="none" w="med" len="med"/>
+            <a:tailEnd type="none" w="med" len="med"/>
+          </a:ln>
+        </p:spPr>
+        <p:style>
+          <a:lnRef idx="1">
+            <a:schemeClr val="accent3"/>
+          </a:lnRef>
+          <a:fillRef idx="3">
+            <a:schemeClr val="accent3"/>
+          </a:fillRef>
+          <a:effectRef idx="2">
+            <a:schemeClr val="accent3"/>
+          </a:effectRef>
+          <a:fontRef idx="minor">
+            <a:schemeClr val="lt1"/>
+          </a:fontRef>
+        </p:style>
+        <p:txBody>
+          <a:bodyPr anchor="ctr" anchorCtr="1">
+            <a:normAutofit fontScale="92500" lnSpcReduction="10000"/>
+          </a:bodyPr>
+          <a:lstStyle/>
+          <a:p>
+            <a:pPr algn="ctr">
+              <a:defRPr/>
+            </a:pPr>
+            <a:r>
+              <a:rPr lang="en-US" sz="6000" b="1" dirty="0" smtClean="0">
+                <a:latin typeface="Times New Roman" pitchFamily="18" charset="0"/>
+                <a:cs typeface="Times New Roman" pitchFamily="18" charset="0"/>
+              </a:rPr>
+              <a:t>Event Structure</a:t>
+            </a:r>
+            <a:endParaRPr lang="en-US" sz="6000" b="1" dirty="0">
+              <a:latin typeface="Times New Roman" pitchFamily="18" charset="0"/>
+              <a:cs typeface="Times New Roman" pitchFamily="18" charset="0"/>
+            </a:endParaRPr>
+          </a:p>
+        </p:txBody>
+      </p:sp>
+      <p:sp>
+        <p:nvSpPr>
+          <p:cNvPr id="133" name="직사각형 132"/>
+          <p:cNvSpPr/>
+          <p:nvPr/>
+        </p:nvSpPr>
         <p:spPr>
           <a:xfrm>
-            <a:off x="15027176" y="25375185"/>
-            <a:ext cx="14897443" cy="8547987"/>
+            <a:off x="320276" y="17391457"/>
+            <a:ext cx="29604343" cy="17478301"/>
           </a:xfrm>
           <a:prstGeom prst="rect">
             <a:avLst/>
@@ -4709,69 +4927,6 @@
           <a:lstStyle/>
           <a:p>
             <a:pPr algn="just"/>
-            <a:r>
-              <a:rPr lang="en-US" altLang="ko-KR" sz="4400" dirty="0" smtClean="0">
-                <a:solidFill>
-                  <a:schemeClr val="tx1"/>
-                </a:solidFill>
-                <a:latin typeface="Times New Roman" panose="02020603050405020304" pitchFamily="18" charset="0"/>
-                <a:cs typeface="Times New Roman" panose="02020603050405020304" pitchFamily="18" charset="0"/>
-              </a:rPr>
-              <a:t>Server offload with shiny. </a:t>
-            </a:r>
-          </a:p>
-          <a:p>
-            <a:pPr algn="just"/>
-            <a:r>
-              <a:rPr lang="en-US" altLang="ko-KR" sz="4400" dirty="0" smtClean="0">
-                <a:solidFill>
-                  <a:schemeClr val="tx1"/>
-                </a:solidFill>
-                <a:latin typeface="Times New Roman" panose="02020603050405020304" pitchFamily="18" charset="0"/>
-                <a:cs typeface="Times New Roman" panose="02020603050405020304" pitchFamily="18" charset="0"/>
-              </a:rPr>
-              <a:t>Using JavaScript-based platform can be extended to </a:t>
-            </a:r>
-            <a:r>
-              <a:rPr lang="en-US" altLang="ko-KR" sz="4400" dirty="0" smtClean="0">
-                <a:solidFill>
-                  <a:schemeClr val="tx1"/>
-                </a:solidFill>
-                <a:latin typeface="Times New Roman" panose="02020603050405020304" pitchFamily="18" charset="0"/>
-                <a:cs typeface="Times New Roman" panose="02020603050405020304" pitchFamily="18" charset="0"/>
-              </a:rPr>
-              <a:t>provide server-offload to users by </a:t>
-            </a:r>
-            <a:r>
-              <a:rPr lang="en-US" altLang="ko-KR" sz="4400" dirty="0" smtClean="0">
-                <a:solidFill>
-                  <a:schemeClr val="tx1"/>
-                </a:solidFill>
-                <a:latin typeface="Times New Roman" panose="02020603050405020304" pitchFamily="18" charset="0"/>
-                <a:cs typeface="Times New Roman" panose="02020603050405020304" pitchFamily="18" charset="0"/>
-              </a:rPr>
-              <a:t>taking advantage </a:t>
-            </a:r>
-            <a:r>
-              <a:rPr lang="en-US" altLang="ko-KR" sz="4400" dirty="0" smtClean="0">
-                <a:solidFill>
-                  <a:schemeClr val="tx1"/>
-                </a:solidFill>
-                <a:latin typeface="Times New Roman" panose="02020603050405020304" pitchFamily="18" charset="0"/>
-                <a:cs typeface="Times New Roman" panose="02020603050405020304" pitchFamily="18" charset="0"/>
-              </a:rPr>
-              <a:t>of </a:t>
-            </a:r>
-            <a:r>
-              <a:rPr lang="en-US" altLang="ko-KR" sz="4400" smtClean="0">
-                <a:solidFill>
-                  <a:schemeClr val="tx1"/>
-                </a:solidFill>
-                <a:latin typeface="Times New Roman" panose="02020603050405020304" pitchFamily="18" charset="0"/>
-                <a:cs typeface="Times New Roman" panose="02020603050405020304" pitchFamily="18" charset="0"/>
-              </a:rPr>
-              <a:t>Shiny package.</a:t>
-            </a:r>
             <a:endParaRPr lang="ko-KR" altLang="en-US" sz="4400" dirty="0">
               <a:solidFill>
                 <a:schemeClr val="tx1"/>
@@ -4782,23 +4937,247 @@
           </a:p>
         </p:txBody>
       </p:sp>
-      <p:sp>
-        <p:nvSpPr>
-          <p:cNvPr id="127" name="직사각형 126"/>
-          <p:cNvSpPr/>
+      <p:pic>
+        <p:nvPicPr>
+          <p:cNvPr id="16" name="그림 15"/>
+          <p:cNvPicPr>
+            <a:picLocks noChangeAspect="1"/>
+          </p:cNvPicPr>
           <p:nvPr/>
-        </p:nvSpPr>
+        </p:nvPicPr>
+        <p:blipFill>
+          <a:blip r:embed="rId4"/>
+          <a:stretch>
+            <a:fillRect/>
+          </a:stretch>
+        </p:blipFill>
         <p:spPr>
           <a:xfrm>
-            <a:off x="306340" y="35204400"/>
-            <a:ext cx="29618279" cy="6955880"/>
+            <a:off x="16511265" y="18517610"/>
+            <a:ext cx="12097344" cy="4801308"/>
           </a:xfrm>
           <a:prstGeom prst="rect">
             <a:avLst/>
           </a:prstGeom>
-          <a:solidFill>
-            <a:schemeClr val="bg1"/>
-          </a:solidFill>
+        </p:spPr>
+      </p:pic>
+      <p:sp>
+        <p:nvSpPr>
+          <p:cNvPr id="17" name="TextBox 16"/>
+          <p:cNvSpPr txBox="1"/>
+          <p:nvPr/>
+        </p:nvSpPr>
+        <p:spPr>
+          <a:xfrm>
+            <a:off x="15344452" y="17511849"/>
+            <a:ext cx="5453031" cy="769441"/>
+          </a:xfrm>
+          <a:prstGeom prst="rect">
+            <a:avLst/>
+          </a:prstGeom>
+        </p:spPr>
+        <p:txBody>
+          <a:bodyPr wrap="none" rtlCol="0">
+            <a:spAutoFit/>
+          </a:bodyPr>
+          <a:lstStyle/>
+          <a:p>
+            <a:pPr algn="just"/>
+            <a:r>
+              <a:rPr lang="en-US" altLang="ko-KR" sz="4400" b="1" dirty="0" smtClean="0">
+                <a:latin typeface="Times New Roman" panose="02020603050405020304" pitchFamily="18" charset="0"/>
+                <a:cs typeface="Times New Roman" panose="02020603050405020304" pitchFamily="18" charset="0"/>
+              </a:rPr>
+              <a:t>&lt;Relationship Array&gt;</a:t>
+            </a:r>
+            <a:endParaRPr lang="ko-KR" altLang="en-US" sz="4400" b="1" dirty="0" smtClean="0">
+              <a:latin typeface="Times New Roman" panose="02020603050405020304" pitchFamily="18" charset="0"/>
+              <a:cs typeface="Times New Roman" panose="02020603050405020304" pitchFamily="18" charset="0"/>
+            </a:endParaRPr>
+          </a:p>
+        </p:txBody>
+      </p:sp>
+      <p:sp>
+        <p:nvSpPr>
+          <p:cNvPr id="18" name="TextBox 17"/>
+          <p:cNvSpPr txBox="1"/>
+          <p:nvPr/>
+        </p:nvSpPr>
+        <p:spPr>
+          <a:xfrm>
+            <a:off x="15360127" y="23201981"/>
+            <a:ext cx="14360819" cy="4154984"/>
+          </a:xfrm>
+          <a:prstGeom prst="rect">
+            <a:avLst/>
+          </a:prstGeom>
+        </p:spPr>
+        <p:txBody>
+          <a:bodyPr wrap="square" rtlCol="0">
+            <a:spAutoFit/>
+          </a:bodyPr>
+          <a:lstStyle/>
+          <a:p>
+            <a:pPr algn="just"/>
+            <a:r>
+              <a:rPr lang="en-US" altLang="ko-KR" sz="4400" dirty="0" smtClean="0">
+                <a:latin typeface="Times New Roman" panose="02020603050405020304" pitchFamily="18" charset="0"/>
+                <a:cs typeface="Times New Roman" panose="02020603050405020304" pitchFamily="18" charset="0"/>
+              </a:rPr>
+              <a:t>Relationship Array represents node relationship between two different graphs by</a:t>
+            </a:r>
+            <a:r>
+              <a:rPr lang="ko-KR" altLang="en-US" sz="4400" dirty="0">
+                <a:latin typeface="Times New Roman" panose="02020603050405020304" pitchFamily="18" charset="0"/>
+                <a:cs typeface="Times New Roman" panose="02020603050405020304" pitchFamily="18" charset="0"/>
+              </a:rPr>
+              <a:t> </a:t>
+            </a:r>
+            <a:r>
+              <a:rPr lang="en-US" altLang="ko-KR" sz="4400" dirty="0" smtClean="0">
+                <a:latin typeface="Times New Roman" panose="02020603050405020304" pitchFamily="18" charset="0"/>
+                <a:cs typeface="Times New Roman" panose="02020603050405020304" pitchFamily="18" charset="0"/>
+              </a:rPr>
+              <a:t>assigning 1 or 0 to the value of array. As shown above, if two nodes from different graphs are connected (e.g. node 3 of dot &lt;-&gt; node 0, 1 of line), the appropriate value of the array is set by 1 (e.g. row number 3, and column number 0, 1). </a:t>
+            </a:r>
+          </a:p>
+        </p:txBody>
+      </p:sp>
+      <p:sp>
+        <p:nvSpPr>
+          <p:cNvPr id="150" name="TextBox 149"/>
+          <p:cNvSpPr txBox="1"/>
+          <p:nvPr/>
+        </p:nvSpPr>
+        <p:spPr>
+          <a:xfrm>
+            <a:off x="414470" y="17511850"/>
+            <a:ext cx="4982454" cy="769441"/>
+          </a:xfrm>
+          <a:prstGeom prst="rect">
+            <a:avLst/>
+          </a:prstGeom>
+        </p:spPr>
+        <p:txBody>
+          <a:bodyPr wrap="none" rtlCol="0">
+            <a:spAutoFit/>
+          </a:bodyPr>
+          <a:lstStyle/>
+          <a:p>
+            <a:pPr algn="just"/>
+            <a:r>
+              <a:rPr lang="en-US" altLang="ko-KR" sz="4400" b="1" dirty="0" smtClean="0">
+                <a:latin typeface="Times New Roman" panose="02020603050405020304" pitchFamily="18" charset="0"/>
+                <a:cs typeface="Times New Roman" panose="02020603050405020304" pitchFamily="18" charset="0"/>
+              </a:rPr>
+              <a:t>&lt;Update Sequence&gt;</a:t>
+            </a:r>
+            <a:endParaRPr lang="ko-KR" altLang="en-US" sz="4400" b="1" dirty="0" smtClean="0">
+              <a:latin typeface="Times New Roman" panose="02020603050405020304" pitchFamily="18" charset="0"/>
+              <a:cs typeface="Times New Roman" panose="02020603050405020304" pitchFamily="18" charset="0"/>
+            </a:endParaRPr>
+          </a:p>
+        </p:txBody>
+      </p:sp>
+      <p:pic>
+        <p:nvPicPr>
+          <p:cNvPr id="20" name="그림 19"/>
+          <p:cNvPicPr>
+            <a:picLocks noChangeAspect="1"/>
+          </p:cNvPicPr>
+          <p:nvPr/>
+        </p:nvPicPr>
+        <p:blipFill>
+          <a:blip r:embed="rId5"/>
+          <a:stretch>
+            <a:fillRect/>
+          </a:stretch>
+        </p:blipFill>
+        <p:spPr>
+          <a:xfrm>
+            <a:off x="624707" y="18759802"/>
+            <a:ext cx="14189468" cy="3844635"/>
+          </a:xfrm>
+          <a:prstGeom prst="rect">
+            <a:avLst/>
+          </a:prstGeom>
+        </p:spPr>
+      </p:pic>
+      <p:sp>
+        <p:nvSpPr>
+          <p:cNvPr id="153" name="TextBox 152"/>
+          <p:cNvSpPr txBox="1"/>
+          <p:nvPr/>
+        </p:nvSpPr>
+        <p:spPr>
+          <a:xfrm>
+            <a:off x="436323" y="23201981"/>
+            <a:ext cx="14631656" cy="3477875"/>
+          </a:xfrm>
+          <a:prstGeom prst="rect">
+            <a:avLst/>
+          </a:prstGeom>
+        </p:spPr>
+        <p:txBody>
+          <a:bodyPr wrap="square" rtlCol="0">
+            <a:spAutoFit/>
+          </a:bodyPr>
+          <a:lstStyle/>
+          <a:p>
+            <a:pPr algn="just"/>
+            <a:r>
+              <a:rPr lang="en-US" altLang="ko-KR" sz="4400" dirty="0" smtClean="0">
+                <a:latin typeface="Times New Roman" panose="02020603050405020304" pitchFamily="18" charset="0"/>
+                <a:cs typeface="Times New Roman" panose="02020603050405020304" pitchFamily="18" charset="0"/>
+              </a:rPr>
+              <a:t>Relationship Array </a:t>
+            </a:r>
+            <a:r>
+              <a:rPr lang="en-US" altLang="ko-KR" sz="4400" dirty="0" smtClean="0">
+                <a:latin typeface="Times New Roman" panose="02020603050405020304" pitchFamily="18" charset="0"/>
+                <a:cs typeface="Times New Roman" panose="02020603050405020304" pitchFamily="18" charset="0"/>
+              </a:rPr>
+              <a:t>can </a:t>
+            </a:r>
+            <a:r>
+              <a:rPr lang="en-US" altLang="ko-KR" sz="4400" dirty="0" smtClean="0">
+                <a:latin typeface="Times New Roman" panose="02020603050405020304" pitchFamily="18" charset="0"/>
+                <a:cs typeface="Times New Roman" panose="02020603050405020304" pitchFamily="18" charset="0"/>
+              </a:rPr>
+              <a:t>be used for update sequence. When some nodes of one graph is updated, the correlated node of another graph can be found by multiplying with Relationship Array. In this manner, we can simply propagate updated node numbers using </a:t>
+            </a:r>
+            <a:r>
+              <a:rPr lang="en-US" altLang="ko-KR" sz="4400" dirty="0">
+                <a:latin typeface="Times New Roman" panose="02020603050405020304" pitchFamily="18" charset="0"/>
+                <a:cs typeface="Times New Roman" panose="02020603050405020304" pitchFamily="18" charset="0"/>
+              </a:rPr>
+              <a:t>array </a:t>
+            </a:r>
+            <a:r>
+              <a:rPr lang="en-US" altLang="ko-KR" sz="4400" dirty="0" smtClean="0">
+                <a:latin typeface="Times New Roman" panose="02020603050405020304" pitchFamily="18" charset="0"/>
+                <a:cs typeface="Times New Roman" panose="02020603050405020304" pitchFamily="18" charset="0"/>
+              </a:rPr>
+              <a:t>multiplication.</a:t>
+            </a:r>
+          </a:p>
+        </p:txBody>
+      </p:sp>
+      <p:sp>
+        <p:nvSpPr>
+          <p:cNvPr id="38" name="직사각형 37"/>
+          <p:cNvSpPr/>
+          <p:nvPr/>
+        </p:nvSpPr>
+        <p:spPr>
+          <a:xfrm>
+            <a:off x="320276" y="17386690"/>
+            <a:ext cx="14846004" cy="10090839"/>
+          </a:xfrm>
+          <a:prstGeom prst="rect">
+            <a:avLst/>
+          </a:prstGeom>
+          <a:noFill/>
           <a:ln w="50800">
             <a:solidFill>
               <a:schemeClr val="tx1">
@@ -4825,31 +5204,35 @@
           </a:fontRef>
         </p:style>
         <p:txBody>
-          <a:bodyPr rtlCol="0" anchor="ctr"/>
-          <a:lstStyle/>
-          <a:p>
-            <a:pPr algn="ctr"/>
-            <a:endParaRPr lang="ko-KR" altLang="en-US" dirty="0"/>
-          </a:p>
-        </p:txBody>
-      </p:sp>
-      <p:sp>
-        <p:nvSpPr>
-          <p:cNvPr id="115" name="직사각형 114"/>
+          <a:bodyPr rtlCol="0" anchor="t"/>
+          <a:lstStyle/>
+          <a:p>
+            <a:pPr algn="just"/>
+            <a:endParaRPr lang="ko-KR" altLang="en-US" sz="4400" dirty="0">
+              <a:solidFill>
+                <a:schemeClr val="tx1"/>
+              </a:solidFill>
+              <a:latin typeface="Times New Roman" panose="02020603050405020304" pitchFamily="18" charset="0"/>
+              <a:cs typeface="Times New Roman" panose="02020603050405020304" pitchFamily="18" charset="0"/>
+            </a:endParaRPr>
+          </a:p>
+        </p:txBody>
+      </p:sp>
+      <p:sp>
+        <p:nvSpPr>
+          <p:cNvPr id="39" name="직사각형 38"/>
           <p:cNvSpPr/>
           <p:nvPr/>
         </p:nvSpPr>
         <p:spPr>
           <a:xfrm>
-            <a:off x="314311" y="22795655"/>
-            <a:ext cx="14435273" cy="11127517"/>
+            <a:off x="15163800" y="17386691"/>
+            <a:ext cx="14754256" cy="10100151"/>
           </a:xfrm>
           <a:prstGeom prst="rect">
             <a:avLst/>
           </a:prstGeom>
-          <a:solidFill>
-            <a:schemeClr val="bg1"/>
-          </a:solidFill>
+          <a:noFill/>
           <a:ln w="50800">
             <a:solidFill>
               <a:schemeClr val="tx1">
@@ -4892,6 +5275,1534 @@
       </p:sp>
       <p:sp>
         <p:nvSpPr>
+          <p:cNvPr id="40" name="TextBox 39"/>
+          <p:cNvSpPr txBox="1"/>
+          <p:nvPr/>
+        </p:nvSpPr>
+        <p:spPr>
+          <a:xfrm>
+            <a:off x="414470" y="27606066"/>
+            <a:ext cx="5318507" cy="769441"/>
+          </a:xfrm>
+          <a:prstGeom prst="rect">
+            <a:avLst/>
+          </a:prstGeom>
+        </p:spPr>
+        <p:txBody>
+          <a:bodyPr wrap="none" rtlCol="0">
+            <a:spAutoFit/>
+          </a:bodyPr>
+          <a:lstStyle/>
+          <a:p>
+            <a:pPr algn="just"/>
+            <a:r>
+              <a:rPr lang="en-US" altLang="ko-KR" sz="4400" b="1" dirty="0" smtClean="0">
+                <a:latin typeface="Times New Roman" panose="02020603050405020304" pitchFamily="18" charset="0"/>
+                <a:cs typeface="Times New Roman" panose="02020603050405020304" pitchFamily="18" charset="0"/>
+              </a:rPr>
+              <a:t>&lt;Event propagation&gt;</a:t>
+            </a:r>
+            <a:endParaRPr lang="ko-KR" altLang="en-US" sz="4400" b="1" dirty="0" smtClean="0">
+              <a:latin typeface="Times New Roman" panose="02020603050405020304" pitchFamily="18" charset="0"/>
+              <a:cs typeface="Times New Roman" panose="02020603050405020304" pitchFamily="18" charset="0"/>
+            </a:endParaRPr>
+          </a:p>
+        </p:txBody>
+      </p:sp>
+      <p:sp>
+        <p:nvSpPr>
+          <p:cNvPr id="41" name="직사각형 40"/>
+          <p:cNvSpPr/>
+          <p:nvPr/>
+        </p:nvSpPr>
+        <p:spPr>
+          <a:xfrm>
+            <a:off x="306340" y="35987978"/>
+            <a:ext cx="14443244" cy="6186309"/>
+          </a:xfrm>
+          <a:prstGeom prst="rect">
+            <a:avLst/>
+          </a:prstGeom>
+          <a:solidFill>
+            <a:schemeClr val="bg1"/>
+          </a:solidFill>
+          <a:ln w="50800">
+            <a:solidFill>
+              <a:schemeClr val="tx1">
+                <a:lumMod val="50000"/>
+                <a:lumOff val="50000"/>
+              </a:schemeClr>
+            </a:solidFill>
+          </a:ln>
+          <a:effectLst/>
+        </p:spPr>
+        <p:style>
+          <a:lnRef idx="1">
+            <a:schemeClr val="accent1"/>
+          </a:lnRef>
+          <a:fillRef idx="2">
+            <a:schemeClr val="accent1"/>
+          </a:fillRef>
+          <a:effectRef idx="1">
+            <a:schemeClr val="accent1"/>
+          </a:effectRef>
+          <a:fontRef idx="minor">
+            <a:schemeClr val="dk1"/>
+          </a:fontRef>
+        </p:style>
+        <p:txBody>
+          <a:bodyPr wrap="square">
+            <a:spAutoFit/>
+          </a:bodyPr>
+          <a:lstStyle/>
+          <a:p>
+            <a:pPr algn="just"/>
+            <a:r>
+              <a:rPr lang="en-US" altLang="ko-KR" sz="4400" dirty="0" smtClean="0">
+                <a:solidFill>
+                  <a:schemeClr val="tx1"/>
+                </a:solidFill>
+                <a:latin typeface="Times New Roman" panose="02020603050405020304" pitchFamily="18" charset="0"/>
+                <a:cs typeface="Times New Roman" panose="02020603050405020304" pitchFamily="18" charset="0"/>
+              </a:rPr>
+              <a:t>After installing RIGHT package</a:t>
+            </a:r>
+          </a:p>
+          <a:p>
+            <a:pPr algn="just"/>
+            <a:endParaRPr lang="en-US" altLang="ko-KR" sz="4400" dirty="0">
+              <a:solidFill>
+                <a:schemeClr val="tx1"/>
+              </a:solidFill>
+              <a:latin typeface="Times New Roman" panose="02020603050405020304" pitchFamily="18" charset="0"/>
+              <a:cs typeface="Times New Roman" panose="02020603050405020304" pitchFamily="18" charset="0"/>
+            </a:endParaRPr>
+          </a:p>
+          <a:p>
+            <a:pPr algn="just"/>
+            <a:endParaRPr lang="en-US" altLang="ko-KR" sz="4400" dirty="0" smtClean="0">
+              <a:solidFill>
+                <a:schemeClr val="tx1"/>
+              </a:solidFill>
+              <a:latin typeface="Times New Roman" panose="02020603050405020304" pitchFamily="18" charset="0"/>
+              <a:cs typeface="Times New Roman" panose="02020603050405020304" pitchFamily="18" charset="0"/>
+            </a:endParaRPr>
+          </a:p>
+          <a:p>
+            <a:pPr algn="just"/>
+            <a:endParaRPr lang="en-US" altLang="ko-KR" sz="4400" dirty="0">
+              <a:solidFill>
+                <a:schemeClr val="tx1"/>
+              </a:solidFill>
+              <a:latin typeface="Times New Roman" panose="02020603050405020304" pitchFamily="18" charset="0"/>
+              <a:cs typeface="Times New Roman" panose="02020603050405020304" pitchFamily="18" charset="0"/>
+            </a:endParaRPr>
+          </a:p>
+          <a:p>
+            <a:pPr algn="just"/>
+            <a:endParaRPr lang="en-US" altLang="ko-KR" sz="4400" dirty="0" smtClean="0">
+              <a:solidFill>
+                <a:schemeClr val="tx1"/>
+              </a:solidFill>
+              <a:latin typeface="Times New Roman" panose="02020603050405020304" pitchFamily="18" charset="0"/>
+              <a:cs typeface="Times New Roman" panose="02020603050405020304" pitchFamily="18" charset="0"/>
+            </a:endParaRPr>
+          </a:p>
+          <a:p>
+            <a:pPr algn="just"/>
+            <a:endParaRPr lang="en-US" altLang="ko-KR" sz="4400" dirty="0" smtClean="0">
+              <a:solidFill>
+                <a:schemeClr val="tx1"/>
+              </a:solidFill>
+              <a:latin typeface="Times New Roman" panose="02020603050405020304" pitchFamily="18" charset="0"/>
+              <a:cs typeface="Times New Roman" panose="02020603050405020304" pitchFamily="18" charset="0"/>
+            </a:endParaRPr>
+          </a:p>
+          <a:p>
+            <a:pPr algn="just"/>
+            <a:endParaRPr lang="en-US" altLang="ko-KR" sz="4400" dirty="0">
+              <a:solidFill>
+                <a:schemeClr val="tx1"/>
+              </a:solidFill>
+              <a:latin typeface="Times New Roman" panose="02020603050405020304" pitchFamily="18" charset="0"/>
+              <a:cs typeface="Times New Roman" panose="02020603050405020304" pitchFamily="18" charset="0"/>
+            </a:endParaRPr>
+          </a:p>
+          <a:p>
+            <a:pPr algn="just"/>
+            <a:endParaRPr lang="en-US" altLang="ko-KR" sz="4400" dirty="0" smtClean="0">
+              <a:solidFill>
+                <a:schemeClr val="tx1"/>
+              </a:solidFill>
+              <a:latin typeface="Times New Roman" panose="02020603050405020304" pitchFamily="18" charset="0"/>
+              <a:cs typeface="Times New Roman" panose="02020603050405020304" pitchFamily="18" charset="0"/>
+            </a:endParaRPr>
+          </a:p>
+          <a:p>
+            <a:pPr algn="just"/>
+            <a:endParaRPr lang="ko-KR" altLang="en-US" sz="4400" dirty="0">
+              <a:solidFill>
+                <a:schemeClr val="tx1"/>
+              </a:solidFill>
+              <a:latin typeface="Times New Roman" panose="02020603050405020304" pitchFamily="18" charset="0"/>
+              <a:cs typeface="Times New Roman" panose="02020603050405020304" pitchFamily="18" charset="0"/>
+            </a:endParaRPr>
+          </a:p>
+        </p:txBody>
+      </p:sp>
+      <p:sp>
+        <p:nvSpPr>
+          <p:cNvPr id="43" name="Rounded Rectangle 1691"/>
+          <p:cNvSpPr/>
+          <p:nvPr/>
+        </p:nvSpPr>
+        <p:spPr bwMode="auto">
+          <a:xfrm>
+            <a:off x="15537687" y="34958432"/>
+            <a:ext cx="5760640" cy="1016182"/>
+          </a:xfrm>
+          <a:prstGeom prst="roundRect">
+            <a:avLst/>
+          </a:prstGeom>
+          <a:ln>
+            <a:headEnd type="none" w="med" len="med"/>
+            <a:tailEnd type="none" w="med" len="med"/>
+          </a:ln>
+        </p:spPr>
+        <p:style>
+          <a:lnRef idx="1">
+            <a:schemeClr val="accent3"/>
+          </a:lnRef>
+          <a:fillRef idx="3">
+            <a:schemeClr val="accent3"/>
+          </a:fillRef>
+          <a:effectRef idx="2">
+            <a:schemeClr val="accent3"/>
+          </a:effectRef>
+          <a:fontRef idx="minor">
+            <a:schemeClr val="lt1"/>
+          </a:fontRef>
+        </p:style>
+        <p:txBody>
+          <a:bodyPr anchor="ctr" anchorCtr="1">
+            <a:normAutofit fontScale="92500" lnSpcReduction="10000"/>
+          </a:bodyPr>
+          <a:lstStyle/>
+          <a:p>
+            <a:pPr>
+              <a:defRPr/>
+            </a:pPr>
+            <a:r>
+              <a:rPr lang="en-US" sz="6000" b="1" dirty="0" smtClean="0">
+                <a:latin typeface="Times New Roman" pitchFamily="18" charset="0"/>
+                <a:cs typeface="Times New Roman" pitchFamily="18" charset="0"/>
+              </a:rPr>
+              <a:t>Supported Plots</a:t>
+            </a:r>
+            <a:endParaRPr lang="en-US" sz="6000" b="1" dirty="0">
+              <a:latin typeface="Times New Roman" pitchFamily="18" charset="0"/>
+              <a:cs typeface="Times New Roman" pitchFamily="18" charset="0"/>
+            </a:endParaRPr>
+          </a:p>
+        </p:txBody>
+      </p:sp>
+      <p:sp>
+        <p:nvSpPr>
+          <p:cNvPr id="44" name="직사각형 43"/>
+          <p:cNvSpPr/>
+          <p:nvPr/>
+        </p:nvSpPr>
+        <p:spPr>
+          <a:xfrm>
+            <a:off x="15537689" y="35987978"/>
+            <a:ext cx="14443244" cy="6186309"/>
+          </a:xfrm>
+          <a:prstGeom prst="rect">
+            <a:avLst/>
+          </a:prstGeom>
+          <a:solidFill>
+            <a:schemeClr val="bg1"/>
+          </a:solidFill>
+          <a:ln w="50800">
+            <a:solidFill>
+              <a:schemeClr val="tx1">
+                <a:lumMod val="50000"/>
+                <a:lumOff val="50000"/>
+              </a:schemeClr>
+            </a:solidFill>
+          </a:ln>
+          <a:effectLst/>
+        </p:spPr>
+        <p:style>
+          <a:lnRef idx="1">
+            <a:schemeClr val="accent1"/>
+          </a:lnRef>
+          <a:fillRef idx="2">
+            <a:schemeClr val="accent1"/>
+          </a:fillRef>
+          <a:effectRef idx="1">
+            <a:schemeClr val="accent1"/>
+          </a:effectRef>
+          <a:fontRef idx="minor">
+            <a:schemeClr val="dk1"/>
+          </a:fontRef>
+        </p:style>
+        <p:txBody>
+          <a:bodyPr wrap="square">
+            <a:spAutoFit/>
+          </a:bodyPr>
+          <a:lstStyle/>
+          <a:p>
+            <a:pPr algn="just"/>
+            <a:r>
+              <a:rPr lang="en-US" altLang="ko-KR" sz="4400" dirty="0" smtClean="0">
+                <a:solidFill>
+                  <a:schemeClr val="tx1"/>
+                </a:solidFill>
+                <a:latin typeface="Times New Roman" panose="02020603050405020304" pitchFamily="18" charset="0"/>
+                <a:cs typeface="Times New Roman" panose="02020603050405020304" pitchFamily="18" charset="0"/>
+              </a:rPr>
+              <a:t>RIGHT can support 5 basic plots: dot, line, histogram, box-whisker, pie.</a:t>
+            </a:r>
+          </a:p>
+          <a:p>
+            <a:pPr algn="just"/>
+            <a:endParaRPr lang="en-US" altLang="ko-KR" sz="4400" dirty="0">
+              <a:solidFill>
+                <a:schemeClr val="tx1"/>
+              </a:solidFill>
+              <a:latin typeface="Times New Roman" panose="02020603050405020304" pitchFamily="18" charset="0"/>
+              <a:cs typeface="Times New Roman" panose="02020603050405020304" pitchFamily="18" charset="0"/>
+            </a:endParaRPr>
+          </a:p>
+          <a:p>
+            <a:pPr algn="just"/>
+            <a:endParaRPr lang="en-US" altLang="ko-KR" sz="4400" dirty="0" smtClean="0">
+              <a:solidFill>
+                <a:schemeClr val="tx1"/>
+              </a:solidFill>
+              <a:latin typeface="Times New Roman" panose="02020603050405020304" pitchFamily="18" charset="0"/>
+              <a:cs typeface="Times New Roman" panose="02020603050405020304" pitchFamily="18" charset="0"/>
+            </a:endParaRPr>
+          </a:p>
+          <a:p>
+            <a:pPr algn="just"/>
+            <a:endParaRPr lang="en-US" altLang="ko-KR" sz="4400" dirty="0">
+              <a:solidFill>
+                <a:schemeClr val="tx1"/>
+              </a:solidFill>
+              <a:latin typeface="Times New Roman" panose="02020603050405020304" pitchFamily="18" charset="0"/>
+              <a:cs typeface="Times New Roman" panose="02020603050405020304" pitchFamily="18" charset="0"/>
+            </a:endParaRPr>
+          </a:p>
+          <a:p>
+            <a:pPr algn="just"/>
+            <a:endParaRPr lang="en-US" altLang="ko-KR" sz="4400" dirty="0" smtClean="0">
+              <a:solidFill>
+                <a:schemeClr val="tx1"/>
+              </a:solidFill>
+              <a:latin typeface="Times New Roman" panose="02020603050405020304" pitchFamily="18" charset="0"/>
+              <a:cs typeface="Times New Roman" panose="02020603050405020304" pitchFamily="18" charset="0"/>
+            </a:endParaRPr>
+          </a:p>
+          <a:p>
+            <a:pPr algn="just"/>
+            <a:endParaRPr lang="en-US" altLang="ko-KR" sz="4400" dirty="0">
+              <a:solidFill>
+                <a:schemeClr val="tx1"/>
+              </a:solidFill>
+              <a:latin typeface="Times New Roman" panose="02020603050405020304" pitchFamily="18" charset="0"/>
+              <a:cs typeface="Times New Roman" panose="02020603050405020304" pitchFamily="18" charset="0"/>
+            </a:endParaRPr>
+          </a:p>
+          <a:p>
+            <a:pPr algn="just"/>
+            <a:endParaRPr lang="en-US" altLang="ko-KR" sz="4400" dirty="0" smtClean="0">
+              <a:solidFill>
+                <a:schemeClr val="tx1"/>
+              </a:solidFill>
+              <a:latin typeface="Times New Roman" panose="02020603050405020304" pitchFamily="18" charset="0"/>
+              <a:cs typeface="Times New Roman" panose="02020603050405020304" pitchFamily="18" charset="0"/>
+            </a:endParaRPr>
+          </a:p>
+          <a:p>
+            <a:pPr algn="just"/>
+            <a:endParaRPr lang="ko-KR" altLang="en-US" sz="4400" dirty="0">
+              <a:solidFill>
+                <a:schemeClr val="tx1"/>
+              </a:solidFill>
+              <a:latin typeface="Times New Roman" panose="02020603050405020304" pitchFamily="18" charset="0"/>
+              <a:cs typeface="Times New Roman" panose="02020603050405020304" pitchFamily="18" charset="0"/>
+            </a:endParaRPr>
+          </a:p>
+        </p:txBody>
+      </p:sp>
+    </p:spTree>
+    <p:extLst>
+      <p:ext uri="{BB962C8B-B14F-4D97-AF65-F5344CB8AC3E}">
+        <p14:creationId xmlns:p14="http://schemas.microsoft.com/office/powerpoint/2010/main" val="1915647320"/>
+      </p:ext>
+    </p:extLst>
+  </p:cSld>
+  <p:clrMapOvr>
+    <a:masterClrMapping/>
+  </p:clrMapOvr>
+  <p:timing>
+    <p:tnLst>
+      <p:par>
+        <p:cTn id="1" dur="indefinite" restart="never" nodeType="tmRoot"/>
+      </p:par>
+    </p:tnLst>
+  </p:timing>
+</p:sld>
+</file>
+
+<file path=ppt/slides/slide2.xml><?xml version="1.0" encoding="utf-8"?>
+<p:sld xmlns:a="http://schemas.openxmlformats.org/drawingml/2006/main" xmlns:r="http://schemas.openxmlformats.org/officeDocument/2006/relationships" xmlns:p="http://schemas.openxmlformats.org/presentationml/2006/main">
+  <p:cSld>
+    <p:spTree>
+      <p:nvGrpSpPr>
+        <p:cNvPr id="1" name=""/>
+        <p:cNvGrpSpPr/>
+        <p:nvPr/>
+      </p:nvGrpSpPr>
+      <p:grpSpPr>
+        <a:xfrm>
+          <a:off x="0" y="0"/>
+          <a:ext cx="0" cy="0"/>
+          <a:chOff x="0" y="0"/>
+          <a:chExt cx="0" cy="0"/>
+        </a:xfrm>
+      </p:grpSpPr>
+      <p:sp>
+        <p:nvSpPr>
+          <p:cNvPr id="10" name="Rounded Rectangle 1691"/>
+          <p:cNvSpPr/>
+          <p:nvPr/>
+        </p:nvSpPr>
+        <p:spPr bwMode="auto">
+          <a:xfrm>
+            <a:off x="306339" y="5418991"/>
+            <a:ext cx="5760640" cy="1016182"/>
+          </a:xfrm>
+          <a:prstGeom prst="roundRect">
+            <a:avLst/>
+          </a:prstGeom>
+          <a:ln>
+            <a:headEnd type="none" w="med" len="med"/>
+            <a:tailEnd type="none" w="med" len="med"/>
+          </a:ln>
+        </p:spPr>
+        <p:style>
+          <a:lnRef idx="1">
+            <a:schemeClr val="accent3"/>
+          </a:lnRef>
+          <a:fillRef idx="3">
+            <a:schemeClr val="accent3"/>
+          </a:fillRef>
+          <a:effectRef idx="2">
+            <a:schemeClr val="accent3"/>
+          </a:effectRef>
+          <a:fontRef idx="minor">
+            <a:schemeClr val="lt1"/>
+          </a:fontRef>
+        </p:style>
+        <p:txBody>
+          <a:bodyPr anchor="ctr" anchorCtr="1">
+            <a:normAutofit fontScale="92500" lnSpcReduction="10000"/>
+          </a:bodyPr>
+          <a:lstStyle/>
+          <a:p>
+            <a:pPr algn="ctr">
+              <a:defRPr/>
+            </a:pPr>
+            <a:r>
+              <a:rPr lang="en-US" sz="6000" b="1" dirty="0" smtClean="0">
+                <a:latin typeface="Times New Roman" pitchFamily="18" charset="0"/>
+                <a:cs typeface="Times New Roman" pitchFamily="18" charset="0"/>
+              </a:rPr>
+              <a:t>Objective</a:t>
+            </a:r>
+            <a:endParaRPr lang="en-US" sz="6000" b="1" dirty="0">
+              <a:latin typeface="Times New Roman" pitchFamily="18" charset="0"/>
+              <a:cs typeface="Times New Roman" pitchFamily="18" charset="0"/>
+            </a:endParaRPr>
+          </a:p>
+        </p:txBody>
+      </p:sp>
+      <p:sp>
+        <p:nvSpPr>
+          <p:cNvPr id="11" name="직사각형 10"/>
+          <p:cNvSpPr/>
+          <p:nvPr/>
+        </p:nvSpPr>
+        <p:spPr>
+          <a:xfrm>
+            <a:off x="306340" y="6502409"/>
+            <a:ext cx="14443244" cy="14988719"/>
+          </a:xfrm>
+          <a:prstGeom prst="rect">
+            <a:avLst/>
+          </a:prstGeom>
+          <a:solidFill>
+            <a:schemeClr val="bg1"/>
+          </a:solidFill>
+          <a:ln w="50800">
+            <a:solidFill>
+              <a:schemeClr val="tx1">
+                <a:lumMod val="50000"/>
+                <a:lumOff val="50000"/>
+              </a:schemeClr>
+            </a:solidFill>
+          </a:ln>
+          <a:effectLst/>
+        </p:spPr>
+        <p:style>
+          <a:lnRef idx="1">
+            <a:schemeClr val="accent1"/>
+          </a:lnRef>
+          <a:fillRef idx="2">
+            <a:schemeClr val="accent1"/>
+          </a:fillRef>
+          <a:effectRef idx="1">
+            <a:schemeClr val="accent1"/>
+          </a:effectRef>
+          <a:fontRef idx="minor">
+            <a:schemeClr val="dk1"/>
+          </a:fontRef>
+        </p:style>
+        <p:txBody>
+          <a:bodyPr wrap="square">
+            <a:spAutoFit/>
+          </a:bodyPr>
+          <a:lstStyle/>
+          <a:p>
+            <a:pPr algn="just"/>
+            <a:r>
+              <a:rPr lang="en-US" altLang="ko-KR" sz="4400" dirty="0" smtClean="0">
+                <a:latin typeface="Times New Roman" panose="02020603050405020304" pitchFamily="18" charset="0"/>
+                <a:cs typeface="Times New Roman" panose="02020603050405020304" pitchFamily="18" charset="0"/>
+              </a:rPr>
+              <a:t>Interactive </a:t>
+            </a:r>
+            <a:r>
+              <a:rPr lang="en-US" altLang="ko-KR" sz="4400" dirty="0">
+                <a:latin typeface="Times New Roman" panose="02020603050405020304" pitchFamily="18" charset="0"/>
+                <a:cs typeface="Times New Roman" panose="02020603050405020304" pitchFamily="18" charset="0"/>
+              </a:rPr>
+              <a:t>data visualization has received broad interest in the </a:t>
+            </a:r>
+            <a:r>
+              <a:rPr lang="en-US" altLang="ko-KR" sz="4400" i="1" dirty="0">
+                <a:latin typeface="Times New Roman" panose="02020603050405020304" pitchFamily="18" charset="0"/>
+                <a:cs typeface="Times New Roman" panose="02020603050405020304" pitchFamily="18" charset="0"/>
+              </a:rPr>
+              <a:t>R</a:t>
+            </a:r>
+            <a:r>
+              <a:rPr lang="en-US" altLang="ko-KR" sz="4400" dirty="0">
+                <a:latin typeface="Times New Roman" panose="02020603050405020304" pitchFamily="18" charset="0"/>
+                <a:cs typeface="Times New Roman" panose="02020603050405020304" pitchFamily="18" charset="0"/>
+              </a:rPr>
+              <a:t> community due to its obvious benefits over static visualization: more information can be delivered concisely and intuitively by user engagement. As a result, various </a:t>
+            </a:r>
+            <a:r>
+              <a:rPr lang="en-US" altLang="ko-KR" sz="4400" i="1" dirty="0">
+                <a:latin typeface="Times New Roman" panose="02020603050405020304" pitchFamily="18" charset="0"/>
+                <a:cs typeface="Times New Roman" panose="02020603050405020304" pitchFamily="18" charset="0"/>
+              </a:rPr>
+              <a:t>R</a:t>
+            </a:r>
+            <a:r>
+              <a:rPr lang="en-US" altLang="ko-KR" sz="4400" dirty="0">
+                <a:latin typeface="Times New Roman" panose="02020603050405020304" pitchFamily="18" charset="0"/>
+                <a:cs typeface="Times New Roman" panose="02020603050405020304" pitchFamily="18" charset="0"/>
+              </a:rPr>
+              <a:t> packages supporting single-layer, multi-layer, and linked graphics have been developed, including </a:t>
+            </a:r>
+            <a:r>
+              <a:rPr lang="en-US" altLang="ko-KR" sz="4400" dirty="0" err="1">
+                <a:latin typeface="Times New Roman" panose="02020603050405020304" pitchFamily="18" charset="0"/>
+                <a:cs typeface="Times New Roman" panose="02020603050405020304" pitchFamily="18" charset="0"/>
+              </a:rPr>
+              <a:t>rCharts</a:t>
+            </a:r>
+            <a:r>
+              <a:rPr lang="en-US" altLang="ko-KR" sz="4400" dirty="0">
+                <a:latin typeface="Times New Roman" panose="02020603050405020304" pitchFamily="18" charset="0"/>
+                <a:cs typeface="Times New Roman" panose="02020603050405020304" pitchFamily="18" charset="0"/>
+              </a:rPr>
+              <a:t>, </a:t>
+            </a:r>
+            <a:r>
+              <a:rPr lang="en-US" altLang="ko-KR" sz="4400" dirty="0" err="1">
+                <a:latin typeface="Times New Roman" panose="02020603050405020304" pitchFamily="18" charset="0"/>
+                <a:cs typeface="Times New Roman" panose="02020603050405020304" pitchFamily="18" charset="0"/>
+              </a:rPr>
+              <a:t>iPlots</a:t>
+            </a:r>
+            <a:r>
+              <a:rPr lang="en-US" altLang="ko-KR" sz="4400" dirty="0">
+                <a:latin typeface="Times New Roman" panose="02020603050405020304" pitchFamily="18" charset="0"/>
+                <a:cs typeface="Times New Roman" panose="02020603050405020304" pitchFamily="18" charset="0"/>
+              </a:rPr>
+              <a:t>, </a:t>
+            </a:r>
+            <a:r>
+              <a:rPr lang="en-US" altLang="ko-KR" sz="4400" dirty="0" err="1">
+                <a:latin typeface="Times New Roman" panose="02020603050405020304" pitchFamily="18" charset="0"/>
+                <a:cs typeface="Times New Roman" panose="02020603050405020304" pitchFamily="18" charset="0"/>
+              </a:rPr>
+              <a:t>cranvas</a:t>
+            </a:r>
+            <a:r>
+              <a:rPr lang="en-US" altLang="ko-KR" sz="4400" dirty="0">
+                <a:latin typeface="Times New Roman" panose="02020603050405020304" pitchFamily="18" charset="0"/>
+                <a:cs typeface="Times New Roman" panose="02020603050405020304" pitchFamily="18" charset="0"/>
+              </a:rPr>
+              <a:t>, </a:t>
+            </a:r>
+            <a:r>
+              <a:rPr lang="en-US" altLang="ko-KR" sz="4400" dirty="0" err="1">
+                <a:latin typeface="Times New Roman" panose="02020603050405020304" pitchFamily="18" charset="0"/>
+                <a:cs typeface="Times New Roman" panose="02020603050405020304" pitchFamily="18" charset="0"/>
+              </a:rPr>
+              <a:t>ggvis</a:t>
+            </a:r>
+            <a:r>
+              <a:rPr lang="en-US" altLang="ko-KR" sz="4400" dirty="0">
+                <a:latin typeface="Times New Roman" panose="02020603050405020304" pitchFamily="18" charset="0"/>
+                <a:cs typeface="Times New Roman" panose="02020603050405020304" pitchFamily="18" charset="0"/>
+              </a:rPr>
+              <a:t>, </a:t>
+            </a:r>
+            <a:r>
+              <a:rPr lang="en-US" altLang="ko-KR" sz="4400" dirty="0" err="1">
+                <a:latin typeface="Times New Roman" panose="02020603050405020304" pitchFamily="18" charset="0"/>
+                <a:cs typeface="Times New Roman" panose="02020603050405020304" pitchFamily="18" charset="0"/>
+              </a:rPr>
+              <a:t>animint</a:t>
+            </a:r>
+            <a:r>
+              <a:rPr lang="en-US" altLang="ko-KR" sz="4400" dirty="0">
+                <a:latin typeface="Times New Roman" panose="02020603050405020304" pitchFamily="18" charset="0"/>
+                <a:cs typeface="Times New Roman" panose="02020603050405020304" pitchFamily="18" charset="0"/>
+              </a:rPr>
+              <a:t> and </a:t>
+            </a:r>
+            <a:r>
+              <a:rPr lang="en-US" altLang="ko-KR" sz="4400" dirty="0" err="1" smtClean="0">
+                <a:latin typeface="Times New Roman" panose="02020603050405020304" pitchFamily="18" charset="0"/>
+                <a:cs typeface="Times New Roman" panose="02020603050405020304" pitchFamily="18" charset="0"/>
+              </a:rPr>
+              <a:t>googleVis</a:t>
+            </a:r>
+            <a:r>
+              <a:rPr lang="en-US" altLang="ko-KR" sz="4400" dirty="0" smtClean="0">
+                <a:latin typeface="Times New Roman" panose="02020603050405020304" pitchFamily="18" charset="0"/>
+                <a:cs typeface="Times New Roman" panose="02020603050405020304" pitchFamily="18" charset="0"/>
+              </a:rPr>
+              <a:t>. However, supporting efficient linked graphics that can help answer obvious relationship between multiple plots using same data is still left on the table since it is hard to provide linked graphs fully without specific event structure and event-driven platform. This poster presents an overview of R Interactive Graphics via </a:t>
+            </a:r>
+            <a:r>
+              <a:rPr lang="en-US" altLang="ko-KR" sz="4400" dirty="0" err="1" smtClean="0">
+                <a:latin typeface="Times New Roman" panose="02020603050405020304" pitchFamily="18" charset="0"/>
+                <a:cs typeface="Times New Roman" panose="02020603050405020304" pitchFamily="18" charset="0"/>
+              </a:rPr>
+              <a:t>HTml</a:t>
+            </a:r>
+            <a:r>
+              <a:rPr lang="en-US" altLang="ko-KR" sz="4400" dirty="0" smtClean="0">
+                <a:latin typeface="Times New Roman" panose="02020603050405020304" pitchFamily="18" charset="0"/>
+                <a:cs typeface="Times New Roman" panose="02020603050405020304" pitchFamily="18" charset="0"/>
+              </a:rPr>
+              <a:t> (RIGHT) and the JavaScript data structure that </a:t>
+            </a:r>
+            <a:r>
+              <a:rPr lang="en-US" altLang="ko-KR" sz="4400" dirty="0">
+                <a:latin typeface="Times New Roman" panose="02020603050405020304" pitchFamily="18" charset="0"/>
+                <a:cs typeface="Times New Roman" panose="02020603050405020304" pitchFamily="18" charset="0"/>
+              </a:rPr>
+              <a:t>perfectly</a:t>
+            </a:r>
+            <a:r>
+              <a:rPr lang="en-US" altLang="ko-KR" sz="4400" dirty="0" smtClean="0">
+                <a:latin typeface="Times New Roman" panose="02020603050405020304" pitchFamily="18" charset="0"/>
+                <a:cs typeface="Times New Roman" panose="02020603050405020304" pitchFamily="18" charset="0"/>
+              </a:rPr>
+              <a:t> enables efficient linked graphics. RIGHT is the first package that implements linked graphs using HTML canvas and JavaScript. Also, </a:t>
+            </a:r>
+            <a:r>
+              <a:rPr lang="en-US" altLang="ko-KR" sz="4400" dirty="0">
+                <a:latin typeface="Times New Roman" panose="02020603050405020304" pitchFamily="18" charset="0"/>
+                <a:cs typeface="Times New Roman" panose="02020603050405020304" pitchFamily="18" charset="0"/>
+              </a:rPr>
+              <a:t>HTML canvas and JavaScript make it possible to deliver the visualization to various platforms, including mobile devices, since they are standard web technologies supported by most modern web </a:t>
+            </a:r>
+            <a:r>
+              <a:rPr lang="en-US" altLang="ko-KR" sz="4400" dirty="0" smtClean="0">
+                <a:latin typeface="Times New Roman" panose="02020603050405020304" pitchFamily="18" charset="0"/>
+                <a:cs typeface="Times New Roman" panose="02020603050405020304" pitchFamily="18" charset="0"/>
+              </a:rPr>
+              <a:t>browsers. </a:t>
+            </a:r>
+            <a:r>
+              <a:rPr lang="en-US" altLang="ko-KR" sz="4400" dirty="0">
+                <a:latin typeface="Times New Roman" panose="02020603050405020304" pitchFamily="18" charset="0"/>
+                <a:cs typeface="Times New Roman" panose="02020603050405020304" pitchFamily="18" charset="0"/>
+              </a:rPr>
+              <a:t>This approach can also benefit from the improvement of JavaScript performance every generation, driven by various web applications with ever increasing complexity and sophistication.</a:t>
+            </a:r>
+            <a:endParaRPr lang="ko-KR" altLang="en-US" sz="4400" dirty="0">
+              <a:latin typeface="Times New Roman" pitchFamily="18" charset="0"/>
+              <a:cs typeface="Times New Roman" pitchFamily="18" charset="0"/>
+            </a:endParaRPr>
+          </a:p>
+        </p:txBody>
+      </p:sp>
+      <p:sp>
+        <p:nvSpPr>
+          <p:cNvPr id="12" name="Rounded Rectangle 1691"/>
+          <p:cNvSpPr/>
+          <p:nvPr/>
+        </p:nvSpPr>
+        <p:spPr bwMode="auto">
+          <a:xfrm>
+            <a:off x="15013238" y="5418991"/>
+            <a:ext cx="5760640" cy="1016182"/>
+          </a:xfrm>
+          <a:prstGeom prst="roundRect">
+            <a:avLst/>
+          </a:prstGeom>
+          <a:ln>
+            <a:headEnd type="none" w="med" len="med"/>
+            <a:tailEnd type="none" w="med" len="med"/>
+          </a:ln>
+        </p:spPr>
+        <p:style>
+          <a:lnRef idx="1">
+            <a:schemeClr val="accent3"/>
+          </a:lnRef>
+          <a:fillRef idx="3">
+            <a:schemeClr val="accent3"/>
+          </a:fillRef>
+          <a:effectRef idx="2">
+            <a:schemeClr val="accent3"/>
+          </a:effectRef>
+          <a:fontRef idx="minor">
+            <a:schemeClr val="lt1"/>
+          </a:fontRef>
+        </p:style>
+        <p:txBody>
+          <a:bodyPr anchor="ctr" anchorCtr="1">
+            <a:normAutofit fontScale="92500" lnSpcReduction="10000"/>
+          </a:bodyPr>
+          <a:lstStyle/>
+          <a:p>
+            <a:pPr algn="ctr">
+              <a:defRPr/>
+            </a:pPr>
+            <a:r>
+              <a:rPr lang="en-US" sz="6000" b="1" dirty="0" smtClean="0">
+                <a:latin typeface="Times New Roman" pitchFamily="18" charset="0"/>
+                <a:cs typeface="Times New Roman" pitchFamily="18" charset="0"/>
+              </a:rPr>
+              <a:t>Event Structure</a:t>
+            </a:r>
+            <a:endParaRPr lang="en-US" sz="6000" b="1" dirty="0">
+              <a:latin typeface="Times New Roman" pitchFamily="18" charset="0"/>
+              <a:cs typeface="Times New Roman" pitchFamily="18" charset="0"/>
+            </a:endParaRPr>
+          </a:p>
+        </p:txBody>
+      </p:sp>
+      <p:sp>
+        <p:nvSpPr>
+          <p:cNvPr id="14" name="Rounded Rectangle 1691"/>
+          <p:cNvSpPr/>
+          <p:nvPr/>
+        </p:nvSpPr>
+        <p:spPr bwMode="auto">
+          <a:xfrm>
+            <a:off x="288000" y="21693724"/>
+            <a:ext cx="5760640" cy="1016182"/>
+          </a:xfrm>
+          <a:prstGeom prst="roundRect">
+            <a:avLst/>
+          </a:prstGeom>
+          <a:ln>
+            <a:headEnd type="none" w="med" len="med"/>
+            <a:tailEnd type="none" w="med" len="med"/>
+          </a:ln>
+        </p:spPr>
+        <p:style>
+          <a:lnRef idx="1">
+            <a:schemeClr val="accent3"/>
+          </a:lnRef>
+          <a:fillRef idx="3">
+            <a:schemeClr val="accent3"/>
+          </a:fillRef>
+          <a:effectRef idx="2">
+            <a:schemeClr val="accent3"/>
+          </a:effectRef>
+          <a:fontRef idx="minor">
+            <a:schemeClr val="lt1"/>
+          </a:fontRef>
+        </p:style>
+        <p:txBody>
+          <a:bodyPr anchor="ctr" anchorCtr="1">
+            <a:normAutofit fontScale="92500" lnSpcReduction="10000"/>
+          </a:bodyPr>
+          <a:lstStyle/>
+          <a:p>
+            <a:pPr>
+              <a:defRPr/>
+            </a:pPr>
+            <a:r>
+              <a:rPr lang="en-US" sz="6000" b="1" dirty="0" smtClean="0">
+                <a:latin typeface="Times New Roman" pitchFamily="18" charset="0"/>
+                <a:cs typeface="Times New Roman" pitchFamily="18" charset="0"/>
+              </a:rPr>
+              <a:t>Motivation</a:t>
+            </a:r>
+            <a:endParaRPr lang="en-US" sz="6000" b="1" dirty="0">
+              <a:latin typeface="Times New Roman" pitchFamily="18" charset="0"/>
+              <a:cs typeface="Times New Roman" pitchFamily="18" charset="0"/>
+            </a:endParaRPr>
+          </a:p>
+        </p:txBody>
+      </p:sp>
+      <p:sp>
+        <p:nvSpPr>
+          <p:cNvPr id="74" name="Rounded Rectangle 1691"/>
+          <p:cNvSpPr/>
+          <p:nvPr/>
+        </p:nvSpPr>
+        <p:spPr bwMode="auto">
+          <a:xfrm>
+            <a:off x="306338" y="34188218"/>
+            <a:ext cx="5721375" cy="1016182"/>
+          </a:xfrm>
+          <a:prstGeom prst="roundRect">
+            <a:avLst/>
+          </a:prstGeom>
+          <a:ln>
+            <a:headEnd type="none" w="med" len="med"/>
+            <a:tailEnd type="none" w="med" len="med"/>
+          </a:ln>
+        </p:spPr>
+        <p:style>
+          <a:lnRef idx="1">
+            <a:schemeClr val="accent3"/>
+          </a:lnRef>
+          <a:fillRef idx="3">
+            <a:schemeClr val="accent3"/>
+          </a:fillRef>
+          <a:effectRef idx="2">
+            <a:schemeClr val="accent3"/>
+          </a:effectRef>
+          <a:fontRef idx="minor">
+            <a:schemeClr val="lt1"/>
+          </a:fontRef>
+        </p:style>
+        <p:txBody>
+          <a:bodyPr anchor="ctr" anchorCtr="1">
+            <a:normAutofit fontScale="92500" lnSpcReduction="10000"/>
+          </a:bodyPr>
+          <a:lstStyle/>
+          <a:p>
+            <a:pPr algn="ctr">
+              <a:defRPr/>
+            </a:pPr>
+            <a:r>
+              <a:rPr lang="en-US" sz="6000" b="1" dirty="0" smtClean="0">
+                <a:latin typeface="Times New Roman" pitchFamily="18" charset="0"/>
+                <a:cs typeface="Times New Roman" pitchFamily="18" charset="0"/>
+              </a:rPr>
+              <a:t>Supported plots</a:t>
+            </a:r>
+            <a:endParaRPr lang="en-US" sz="6000" b="1" dirty="0">
+              <a:latin typeface="Times New Roman" pitchFamily="18" charset="0"/>
+              <a:cs typeface="Times New Roman" pitchFamily="18" charset="0"/>
+            </a:endParaRPr>
+          </a:p>
+        </p:txBody>
+      </p:sp>
+      <p:sp>
+        <p:nvSpPr>
+          <p:cNvPr id="120" name="Rectangle 28"/>
+          <p:cNvSpPr txBox="1">
+            <a:spLocks noChangeArrowheads="1"/>
+          </p:cNvSpPr>
+          <p:nvPr/>
+        </p:nvSpPr>
+        <p:spPr>
+          <a:xfrm>
+            <a:off x="306338" y="786082"/>
+            <a:ext cx="29618281" cy="4367863"/>
+          </a:xfrm>
+          <a:prstGeom prst="rect">
+            <a:avLst/>
+          </a:prstGeom>
+          <a:ln/>
+        </p:spPr>
+        <p:style>
+          <a:lnRef idx="1">
+            <a:schemeClr val="accent3"/>
+          </a:lnRef>
+          <a:fillRef idx="3">
+            <a:schemeClr val="accent3"/>
+          </a:fillRef>
+          <a:effectRef idx="2">
+            <a:schemeClr val="accent3"/>
+          </a:effectRef>
+          <a:fontRef idx="minor">
+            <a:schemeClr val="lt1"/>
+          </a:fontRef>
+        </p:style>
+        <p:txBody>
+          <a:bodyPr/>
+          <a:lstStyle>
+            <a:lvl1pPr algn="ctr" defTabSz="4176431" rtl="0" eaLnBrk="1" latinLnBrk="1" hangingPunct="1">
+              <a:spcBef>
+                <a:spcPct val="0"/>
+              </a:spcBef>
+              <a:buNone/>
+              <a:defRPr sz="20100" kern="1200">
+                <a:solidFill>
+                  <a:schemeClr val="tx1"/>
+                </a:solidFill>
+                <a:latin typeface="+mj-lt"/>
+                <a:ea typeface="+mj-ea"/>
+                <a:cs typeface="+mj-cs"/>
+              </a:defRPr>
+            </a:lvl1pPr>
+          </a:lstStyle>
+          <a:p>
+            <a:endParaRPr lang="en-US" altLang="ko-KR" sz="6000" dirty="0">
+              <a:latin typeface="FrutigerNextLT Regular" pitchFamily="18" charset="0"/>
+            </a:endParaRPr>
+          </a:p>
+        </p:txBody>
+      </p:sp>
+      <p:sp>
+        <p:nvSpPr>
+          <p:cNvPr id="121" name="직사각형 120"/>
+          <p:cNvSpPr/>
+          <p:nvPr/>
+        </p:nvSpPr>
+        <p:spPr>
+          <a:xfrm>
+            <a:off x="1949727" y="810815"/>
+            <a:ext cx="26380520" cy="4401205"/>
+          </a:xfrm>
+          <a:prstGeom prst="rect">
+            <a:avLst/>
+          </a:prstGeom>
+        </p:spPr>
+        <p:txBody>
+          <a:bodyPr wrap="square">
+            <a:spAutoFit/>
+          </a:bodyPr>
+          <a:lstStyle/>
+          <a:p>
+            <a:pPr algn="ctr"/>
+            <a:r>
+              <a:rPr lang="en-US" altLang="ko-KR" sz="8000" b="1" dirty="0" smtClean="0">
+                <a:solidFill>
+                  <a:schemeClr val="bg1"/>
+                </a:solidFill>
+                <a:latin typeface="Times New Roman" pitchFamily="18" charset="0"/>
+                <a:ea typeface="Ebrima" pitchFamily="2" charset="0"/>
+                <a:cs typeface="Times New Roman" pitchFamily="18" charset="0"/>
+              </a:rPr>
+              <a:t>RIGHT: an HTML canvas and JavaScript-based</a:t>
+            </a:r>
+            <a:br>
+              <a:rPr lang="en-US" altLang="ko-KR" sz="8000" b="1" dirty="0" smtClean="0">
+                <a:solidFill>
+                  <a:schemeClr val="bg1"/>
+                </a:solidFill>
+                <a:latin typeface="Times New Roman" pitchFamily="18" charset="0"/>
+                <a:ea typeface="Ebrima" pitchFamily="2" charset="0"/>
+                <a:cs typeface="Times New Roman" pitchFamily="18" charset="0"/>
+              </a:rPr>
+            </a:br>
+            <a:r>
+              <a:rPr lang="en-US" altLang="ko-KR" sz="8000" b="1" dirty="0" smtClean="0">
+                <a:solidFill>
+                  <a:schemeClr val="bg1"/>
+                </a:solidFill>
+                <a:latin typeface="Times New Roman" pitchFamily="18" charset="0"/>
+                <a:ea typeface="Ebrima" pitchFamily="2" charset="0"/>
+                <a:cs typeface="Times New Roman" pitchFamily="18" charset="0"/>
+              </a:rPr>
+              <a:t>interactive data visualization package for linked graphics</a:t>
+            </a:r>
+            <a:r>
+              <a:rPr lang="en-US" altLang="ko-KR" sz="5400" dirty="0">
+                <a:solidFill>
+                  <a:schemeClr val="bg1"/>
+                </a:solidFill>
+                <a:latin typeface="Times New Roman" pitchFamily="18" charset="0"/>
+                <a:ea typeface="Ebrima" pitchFamily="2" charset="0"/>
+                <a:cs typeface="Times New Roman" pitchFamily="18" charset="0"/>
+              </a:rPr>
+              <a:t/>
+            </a:r>
+            <a:br>
+              <a:rPr lang="en-US" altLang="ko-KR" sz="5400" dirty="0">
+                <a:solidFill>
+                  <a:schemeClr val="bg1"/>
+                </a:solidFill>
+                <a:latin typeface="Times New Roman" pitchFamily="18" charset="0"/>
+                <a:ea typeface="Ebrima" pitchFamily="2" charset="0"/>
+                <a:cs typeface="Times New Roman" pitchFamily="18" charset="0"/>
+              </a:rPr>
+            </a:br>
+            <a:r>
+              <a:rPr lang="en-US" altLang="ko-KR" sz="4000" dirty="0" smtClean="0">
+                <a:solidFill>
+                  <a:schemeClr val="bg1"/>
+                </a:solidFill>
+                <a:latin typeface="Times New Roman" pitchFamily="18" charset="0"/>
+                <a:ea typeface="Ebrima" pitchFamily="2" charset="0"/>
+                <a:cs typeface="Times New Roman" pitchFamily="18" charset="0"/>
+              </a:rPr>
+              <a:t>ChungHa Sung</a:t>
+            </a:r>
+            <a:r>
+              <a:rPr lang="en-US" altLang="ko-KR" sz="4000" baseline="30000" dirty="0" smtClean="0">
+                <a:solidFill>
+                  <a:schemeClr val="bg1"/>
+                </a:solidFill>
+                <a:latin typeface="Times New Roman" pitchFamily="18" charset="0"/>
+                <a:ea typeface="Ebrima" pitchFamily="2" charset="0"/>
+                <a:cs typeface="Times New Roman" pitchFamily="18" charset="0"/>
+              </a:rPr>
+              <a:t>†</a:t>
+            </a:r>
+            <a:r>
+              <a:rPr lang="en-US" altLang="ko-KR" sz="4000" dirty="0" smtClean="0">
+                <a:solidFill>
+                  <a:schemeClr val="bg1"/>
+                </a:solidFill>
+                <a:latin typeface="Times New Roman" pitchFamily="18" charset="0"/>
+                <a:ea typeface="Ebrima" pitchFamily="2" charset="0"/>
+                <a:cs typeface="Times New Roman" pitchFamily="18" charset="0"/>
+              </a:rPr>
+              <a:t>, </a:t>
+            </a:r>
+            <a:r>
+              <a:rPr lang="en-US" altLang="ko-KR" sz="4000" dirty="0" err="1" smtClean="0">
+                <a:solidFill>
+                  <a:schemeClr val="bg1"/>
+                </a:solidFill>
+                <a:latin typeface="Times New Roman" pitchFamily="18" charset="0"/>
+                <a:ea typeface="Ebrima" pitchFamily="2" charset="0"/>
+                <a:cs typeface="Times New Roman" pitchFamily="18" charset="0"/>
+              </a:rPr>
+              <a:t>TaeJoon</a:t>
+            </a:r>
+            <a:r>
+              <a:rPr lang="en-US" altLang="ko-KR" sz="4000" dirty="0" smtClean="0">
+                <a:solidFill>
+                  <a:schemeClr val="bg1"/>
+                </a:solidFill>
+                <a:latin typeface="Times New Roman" pitchFamily="18" charset="0"/>
+                <a:ea typeface="Ebrima" pitchFamily="2" charset="0"/>
+                <a:cs typeface="Times New Roman" pitchFamily="18" charset="0"/>
+              </a:rPr>
+              <a:t> Song</a:t>
+            </a:r>
+            <a:r>
+              <a:rPr lang="en-US" altLang="ko-KR" sz="4000" baseline="30000" dirty="0" smtClean="0">
+                <a:solidFill>
+                  <a:schemeClr val="bg1"/>
+                </a:solidFill>
+                <a:latin typeface="Times New Roman" pitchFamily="18" charset="0"/>
+                <a:ea typeface="Ebrima" pitchFamily="2" charset="0"/>
+                <a:cs typeface="Times New Roman" pitchFamily="18" charset="0"/>
+              </a:rPr>
+              <a:t>†</a:t>
+            </a:r>
+            <a:r>
+              <a:rPr lang="en-US" altLang="ko-KR" sz="4000" dirty="0" smtClean="0">
+                <a:solidFill>
+                  <a:schemeClr val="bg1"/>
+                </a:solidFill>
+                <a:latin typeface="Times New Roman" pitchFamily="18" charset="0"/>
+                <a:ea typeface="Ebrima" pitchFamily="2" charset="0"/>
+                <a:cs typeface="Times New Roman" pitchFamily="18" charset="0"/>
+              </a:rPr>
+              <a:t>, Jae W. Lee</a:t>
+            </a:r>
+            <a:r>
+              <a:rPr lang="en-US" altLang="ko-KR" sz="4000" baseline="30000" dirty="0" smtClean="0">
+                <a:solidFill>
+                  <a:schemeClr val="bg1"/>
+                </a:solidFill>
+                <a:latin typeface="Times New Roman" pitchFamily="18" charset="0"/>
+                <a:ea typeface="Ebrima" pitchFamily="2" charset="0"/>
+                <a:cs typeface="Times New Roman" pitchFamily="18" charset="0"/>
+              </a:rPr>
+              <a:t>†</a:t>
+            </a:r>
+            <a:r>
+              <a:rPr lang="en-US" altLang="ko-KR" sz="4000" dirty="0" smtClean="0">
+                <a:solidFill>
+                  <a:schemeClr val="bg1"/>
+                </a:solidFill>
+                <a:latin typeface="Times New Roman" pitchFamily="18" charset="0"/>
+                <a:ea typeface="Ebrima" pitchFamily="2" charset="0"/>
+                <a:cs typeface="Times New Roman" pitchFamily="18" charset="0"/>
+              </a:rPr>
+              <a:t>, </a:t>
+            </a:r>
+            <a:r>
+              <a:rPr lang="en-US" altLang="ko-KR" sz="4000" dirty="0" err="1" smtClean="0">
+                <a:solidFill>
+                  <a:schemeClr val="bg1"/>
+                </a:solidFill>
+                <a:latin typeface="Times New Roman" pitchFamily="18" charset="0"/>
+                <a:ea typeface="Ebrima" pitchFamily="2" charset="0"/>
+                <a:cs typeface="Times New Roman" pitchFamily="18" charset="0"/>
+              </a:rPr>
+              <a:t>Junghoon</a:t>
+            </a:r>
+            <a:r>
+              <a:rPr lang="en-US" altLang="ko-KR" sz="4000" dirty="0" smtClean="0">
+                <a:solidFill>
+                  <a:schemeClr val="bg1"/>
+                </a:solidFill>
+                <a:latin typeface="Times New Roman" pitchFamily="18" charset="0"/>
+                <a:ea typeface="Ebrima" pitchFamily="2" charset="0"/>
+                <a:cs typeface="Times New Roman" pitchFamily="18" charset="0"/>
+              </a:rPr>
+              <a:t> Lee</a:t>
+            </a:r>
+            <a:r>
+              <a:rPr lang="en-US" altLang="ko-KR" sz="4000" baseline="30000" dirty="0">
+                <a:solidFill>
+                  <a:schemeClr val="bg1"/>
+                </a:solidFill>
+                <a:latin typeface="Times New Roman" pitchFamily="18" charset="0"/>
+                <a:ea typeface="Ebrima" pitchFamily="2" charset="0"/>
+                <a:cs typeface="Times New Roman" pitchFamily="18" charset="0"/>
+              </a:rPr>
+              <a:t> ‡</a:t>
+            </a:r>
+            <a:endParaRPr lang="en-US" altLang="ko-KR" sz="4000" baseline="30000" dirty="0" smtClean="0">
+              <a:solidFill>
+                <a:schemeClr val="bg1"/>
+              </a:solidFill>
+              <a:latin typeface="Times New Roman" pitchFamily="18" charset="0"/>
+              <a:ea typeface="Ebrima" pitchFamily="2" charset="0"/>
+              <a:cs typeface="Times New Roman" pitchFamily="18" charset="0"/>
+            </a:endParaRPr>
+          </a:p>
+          <a:p>
+            <a:pPr algn="ctr"/>
+            <a:r>
+              <a:rPr lang="en-US" altLang="ko-KR" sz="4000" baseline="30000" dirty="0">
+                <a:solidFill>
+                  <a:schemeClr val="bg1"/>
+                </a:solidFill>
+                <a:latin typeface="Times New Roman" pitchFamily="18" charset="0"/>
+                <a:ea typeface="Ebrima" pitchFamily="2" charset="0"/>
+                <a:cs typeface="Times New Roman" pitchFamily="18" charset="0"/>
+              </a:rPr>
+              <a:t>†</a:t>
+            </a:r>
+            <a:r>
+              <a:rPr lang="en-US" altLang="ko-KR" sz="4000" dirty="0" err="1">
+                <a:solidFill>
+                  <a:schemeClr val="bg1"/>
+                </a:solidFill>
+                <a:latin typeface="Times New Roman" pitchFamily="18" charset="0"/>
+                <a:ea typeface="Ebrima" pitchFamily="2" charset="0"/>
+                <a:cs typeface="Times New Roman" pitchFamily="18" charset="0"/>
+              </a:rPr>
+              <a:t>Sungkyunkwan</a:t>
+            </a:r>
+            <a:r>
+              <a:rPr lang="en-US" altLang="ko-KR" sz="4000" dirty="0">
+                <a:solidFill>
+                  <a:schemeClr val="bg1"/>
+                </a:solidFill>
+                <a:latin typeface="Times New Roman" pitchFamily="18" charset="0"/>
+                <a:ea typeface="Ebrima" pitchFamily="2" charset="0"/>
+                <a:cs typeface="Times New Roman" pitchFamily="18" charset="0"/>
+              </a:rPr>
+              <a:t> </a:t>
+            </a:r>
+            <a:r>
+              <a:rPr lang="en-US" altLang="ko-KR" sz="4000" dirty="0" smtClean="0">
+                <a:solidFill>
+                  <a:schemeClr val="bg1"/>
+                </a:solidFill>
+                <a:latin typeface="Times New Roman" pitchFamily="18" charset="0"/>
+                <a:ea typeface="Ebrima" pitchFamily="2" charset="0"/>
+                <a:cs typeface="Times New Roman" pitchFamily="18" charset="0"/>
+              </a:rPr>
+              <a:t>University    </a:t>
+            </a:r>
+            <a:r>
+              <a:rPr lang="en-US" altLang="ko-KR" sz="4000" baseline="30000" dirty="0" smtClean="0">
+                <a:solidFill>
+                  <a:schemeClr val="bg1"/>
+                </a:solidFill>
+                <a:latin typeface="Times New Roman" pitchFamily="18" charset="0"/>
+                <a:ea typeface="Ebrima" pitchFamily="2" charset="0"/>
+                <a:cs typeface="Times New Roman" pitchFamily="18" charset="0"/>
+              </a:rPr>
+              <a:t>‡</a:t>
+            </a:r>
+            <a:r>
+              <a:rPr lang="en-US" altLang="ko-KR" sz="4000" dirty="0" smtClean="0">
+                <a:solidFill>
+                  <a:schemeClr val="bg1"/>
+                </a:solidFill>
+                <a:latin typeface="Times New Roman" pitchFamily="18" charset="0"/>
+                <a:ea typeface="Ebrima" pitchFamily="2" charset="0"/>
+                <a:cs typeface="Times New Roman" pitchFamily="18" charset="0"/>
+              </a:rPr>
+              <a:t>Merck Research Laboratories</a:t>
+            </a:r>
+            <a:endParaRPr lang="en-US" altLang="ko-KR" sz="4000" dirty="0">
+              <a:solidFill>
+                <a:schemeClr val="bg1"/>
+              </a:solidFill>
+              <a:latin typeface="Times New Roman" pitchFamily="18" charset="0"/>
+              <a:ea typeface="Ebrima" pitchFamily="2" charset="0"/>
+              <a:cs typeface="Times New Roman" pitchFamily="18" charset="0"/>
+            </a:endParaRPr>
+          </a:p>
+          <a:p>
+            <a:pPr algn="ctr"/>
+            <a:r>
+              <a:rPr lang="en-US" altLang="ko-KR" sz="4000" dirty="0" smtClean="0">
+                <a:solidFill>
+                  <a:schemeClr val="bg1"/>
+                </a:solidFill>
+                <a:latin typeface="Times New Roman" pitchFamily="18" charset="0"/>
+                <a:ea typeface="Ebrima" pitchFamily="2" charset="0"/>
+                <a:cs typeface="Times New Roman" pitchFamily="18" charset="0"/>
+              </a:rPr>
+              <a:t>{</a:t>
+            </a:r>
+            <a:r>
+              <a:rPr lang="en-US" altLang="ko-KR" sz="4000" dirty="0" smtClean="0">
+                <a:solidFill>
+                  <a:srgbClr val="FF0000"/>
+                </a:solidFill>
+                <a:latin typeface="Times New Roman" pitchFamily="18" charset="0"/>
+                <a:ea typeface="Ebrima" pitchFamily="2" charset="0"/>
+                <a:cs typeface="Times New Roman" pitchFamily="18" charset="0"/>
+              </a:rPr>
+              <a:t>sch8906, thepotter89</a:t>
+            </a:r>
+            <a:r>
+              <a:rPr lang="en-US" altLang="ko-KR" sz="4000" dirty="0" smtClean="0">
+                <a:solidFill>
+                  <a:schemeClr val="bg1"/>
+                </a:solidFill>
+                <a:latin typeface="Times New Roman" pitchFamily="18" charset="0"/>
+                <a:ea typeface="Ebrima" pitchFamily="2" charset="0"/>
+                <a:cs typeface="Times New Roman" pitchFamily="18" charset="0"/>
+              </a:rPr>
+              <a:t>, </a:t>
+            </a:r>
+            <a:r>
+              <a:rPr lang="en-US" altLang="ko-KR" sz="4000" dirty="0" err="1">
+                <a:solidFill>
+                  <a:schemeClr val="bg1"/>
+                </a:solidFill>
+                <a:latin typeface="Times New Roman" pitchFamily="18" charset="0"/>
+                <a:ea typeface="Ebrima" pitchFamily="2" charset="0"/>
+                <a:cs typeface="Times New Roman" pitchFamily="18" charset="0"/>
+              </a:rPr>
+              <a:t>jaewlee</a:t>
+            </a:r>
+            <a:r>
+              <a:rPr lang="en-US" altLang="ko-KR" sz="4000" dirty="0" smtClean="0">
+                <a:solidFill>
+                  <a:schemeClr val="bg1"/>
+                </a:solidFill>
+                <a:latin typeface="Times New Roman" pitchFamily="18" charset="0"/>
+                <a:ea typeface="Ebrima" pitchFamily="2" charset="0"/>
+                <a:cs typeface="Times New Roman" pitchFamily="18" charset="0"/>
+              </a:rPr>
+              <a:t>}@gmail.com    jung_hoon_lee@merck.com</a:t>
+            </a:r>
+            <a:endParaRPr lang="en-US" altLang="ko-KR" sz="4000" dirty="0">
+              <a:solidFill>
+                <a:schemeClr val="bg1"/>
+              </a:solidFill>
+              <a:latin typeface="Times New Roman" pitchFamily="18" charset="0"/>
+              <a:ea typeface="Ebrima" pitchFamily="2" charset="0"/>
+              <a:cs typeface="Times New Roman" pitchFamily="18" charset="0"/>
+            </a:endParaRPr>
+          </a:p>
+        </p:txBody>
+      </p:sp>
+      <p:sp>
+        <p:nvSpPr>
+          <p:cNvPr id="133" name="직사각형 132"/>
+          <p:cNvSpPr/>
+          <p:nvPr/>
+        </p:nvSpPr>
+        <p:spPr>
+          <a:xfrm>
+            <a:off x="15027176" y="6520897"/>
+            <a:ext cx="14897443" cy="17478301"/>
+          </a:xfrm>
+          <a:prstGeom prst="rect">
+            <a:avLst/>
+          </a:prstGeom>
+          <a:solidFill>
+            <a:schemeClr val="bg1"/>
+          </a:solidFill>
+          <a:ln w="50800">
+            <a:solidFill>
+              <a:schemeClr val="tx1">
+                <a:lumMod val="50000"/>
+                <a:lumOff val="50000"/>
+              </a:schemeClr>
+            </a:solidFill>
+          </a:ln>
+        </p:spPr>
+        <p:style>
+          <a:lnRef idx="2">
+            <a:schemeClr val="accent1">
+              <a:shade val="50000"/>
+            </a:schemeClr>
+          </a:lnRef>
+          <a:fillRef idx="1">
+            <a:schemeClr val="accent1"/>
+          </a:fillRef>
+          <a:effectRef idx="0">
+            <a:schemeClr val="accent1"/>
+          </a:effectRef>
+          <a:fontRef idx="minor">
+            <a:schemeClr val="lt1"/>
+          </a:fontRef>
+        </p:style>
+        <p:txBody>
+          <a:bodyPr rtlCol="0" anchor="t"/>
+          <a:lstStyle/>
+          <a:p>
+            <a:pPr algn="just"/>
+            <a:endParaRPr lang="ko-KR" altLang="en-US" sz="4400" dirty="0">
+              <a:solidFill>
+                <a:schemeClr val="tx1"/>
+              </a:solidFill>
+              <a:latin typeface="Times New Roman" panose="02020603050405020304" pitchFamily="18" charset="0"/>
+              <a:cs typeface="Times New Roman" panose="02020603050405020304" pitchFamily="18" charset="0"/>
+            </a:endParaRPr>
+          </a:p>
+        </p:txBody>
+      </p:sp>
+      <p:sp>
+        <p:nvSpPr>
+          <p:cNvPr id="126" name="직사각형 125"/>
+          <p:cNvSpPr/>
+          <p:nvPr/>
+        </p:nvSpPr>
+        <p:spPr>
+          <a:xfrm>
+            <a:off x="15027176" y="25375185"/>
+            <a:ext cx="14897443" cy="8547987"/>
+          </a:xfrm>
+          <a:prstGeom prst="rect">
+            <a:avLst/>
+          </a:prstGeom>
+          <a:solidFill>
+            <a:schemeClr val="bg1"/>
+          </a:solidFill>
+          <a:ln w="50800">
+            <a:solidFill>
+              <a:schemeClr val="tx1">
+                <a:lumMod val="50000"/>
+                <a:lumOff val="50000"/>
+              </a:schemeClr>
+            </a:solidFill>
+          </a:ln>
+        </p:spPr>
+        <p:style>
+          <a:lnRef idx="2">
+            <a:schemeClr val="accent1">
+              <a:shade val="50000"/>
+            </a:schemeClr>
+          </a:lnRef>
+          <a:fillRef idx="1">
+            <a:schemeClr val="accent1"/>
+          </a:fillRef>
+          <a:effectRef idx="0">
+            <a:schemeClr val="accent1"/>
+          </a:effectRef>
+          <a:fontRef idx="minor">
+            <a:schemeClr val="lt1"/>
+          </a:fontRef>
+        </p:style>
+        <p:txBody>
+          <a:bodyPr rtlCol="0" anchor="t"/>
+          <a:lstStyle/>
+          <a:p>
+            <a:pPr algn="just"/>
+            <a:r>
+              <a:rPr lang="en-US" altLang="ko-KR" sz="4400" dirty="0" smtClean="0">
+                <a:solidFill>
+                  <a:schemeClr val="tx1"/>
+                </a:solidFill>
+                <a:latin typeface="Times New Roman" panose="02020603050405020304" pitchFamily="18" charset="0"/>
+                <a:cs typeface="Times New Roman" panose="02020603050405020304" pitchFamily="18" charset="0"/>
+              </a:rPr>
+              <a:t>Server offload with shiny. </a:t>
+            </a:r>
+          </a:p>
+          <a:p>
+            <a:pPr algn="just"/>
+            <a:r>
+              <a:rPr lang="en-US" altLang="ko-KR" sz="4400" dirty="0" smtClean="0">
+                <a:solidFill>
+                  <a:schemeClr val="tx1"/>
+                </a:solidFill>
+                <a:latin typeface="Times New Roman" panose="02020603050405020304" pitchFamily="18" charset="0"/>
+                <a:cs typeface="Times New Roman" panose="02020603050405020304" pitchFamily="18" charset="0"/>
+              </a:rPr>
+              <a:t>Using JavaScript-based platform can be extended to provide server-offload to users by taking advantage of </a:t>
+            </a:r>
+            <a:r>
+              <a:rPr lang="en-US" altLang="ko-KR" sz="4400" smtClean="0">
+                <a:solidFill>
+                  <a:schemeClr val="tx1"/>
+                </a:solidFill>
+                <a:latin typeface="Times New Roman" panose="02020603050405020304" pitchFamily="18" charset="0"/>
+                <a:cs typeface="Times New Roman" panose="02020603050405020304" pitchFamily="18" charset="0"/>
+              </a:rPr>
+              <a:t>Shiny package.</a:t>
+            </a:r>
+            <a:endParaRPr lang="ko-KR" altLang="en-US" sz="4400" dirty="0">
+              <a:solidFill>
+                <a:schemeClr val="tx1"/>
+              </a:solidFill>
+              <a:latin typeface="Times New Roman" panose="02020603050405020304" pitchFamily="18" charset="0"/>
+              <a:cs typeface="Times New Roman" panose="02020603050405020304" pitchFamily="18" charset="0"/>
+            </a:endParaRPr>
+          </a:p>
+        </p:txBody>
+      </p:sp>
+      <p:sp>
+        <p:nvSpPr>
+          <p:cNvPr id="127" name="직사각형 126"/>
+          <p:cNvSpPr/>
+          <p:nvPr/>
+        </p:nvSpPr>
+        <p:spPr>
+          <a:xfrm>
+            <a:off x="306340" y="35204400"/>
+            <a:ext cx="29618279" cy="6955880"/>
+          </a:xfrm>
+          <a:prstGeom prst="rect">
+            <a:avLst/>
+          </a:prstGeom>
+          <a:solidFill>
+            <a:schemeClr val="bg1"/>
+          </a:solidFill>
+          <a:ln w="50800">
+            <a:solidFill>
+              <a:schemeClr val="tx1">
+                <a:lumMod val="50000"/>
+                <a:lumOff val="50000"/>
+              </a:schemeClr>
+            </a:solidFill>
+          </a:ln>
+        </p:spPr>
+        <p:style>
+          <a:lnRef idx="2">
+            <a:schemeClr val="accent1">
+              <a:shade val="50000"/>
+            </a:schemeClr>
+          </a:lnRef>
+          <a:fillRef idx="1">
+            <a:schemeClr val="accent1"/>
+          </a:fillRef>
+          <a:effectRef idx="0">
+            <a:schemeClr val="accent1"/>
+          </a:effectRef>
+          <a:fontRef idx="minor">
+            <a:schemeClr val="lt1"/>
+          </a:fontRef>
+        </p:style>
+        <p:txBody>
+          <a:bodyPr rtlCol="0" anchor="ctr"/>
+          <a:lstStyle/>
+          <a:p>
+            <a:pPr algn="ctr"/>
+            <a:endParaRPr lang="ko-KR" altLang="en-US" dirty="0"/>
+          </a:p>
+        </p:txBody>
+      </p:sp>
+      <p:sp>
+        <p:nvSpPr>
+          <p:cNvPr id="115" name="직사각형 114"/>
+          <p:cNvSpPr/>
+          <p:nvPr/>
+        </p:nvSpPr>
+        <p:spPr>
+          <a:xfrm>
+            <a:off x="314311" y="22795655"/>
+            <a:ext cx="14435273" cy="11127517"/>
+          </a:xfrm>
+          <a:prstGeom prst="rect">
+            <a:avLst/>
+          </a:prstGeom>
+          <a:solidFill>
+            <a:schemeClr val="bg1"/>
+          </a:solidFill>
+          <a:ln w="50800">
+            <a:solidFill>
+              <a:schemeClr val="tx1">
+                <a:lumMod val="50000"/>
+                <a:lumOff val="50000"/>
+              </a:schemeClr>
+            </a:solidFill>
+          </a:ln>
+        </p:spPr>
+        <p:style>
+          <a:lnRef idx="2">
+            <a:schemeClr val="accent1">
+              <a:shade val="50000"/>
+            </a:schemeClr>
+          </a:lnRef>
+          <a:fillRef idx="1">
+            <a:schemeClr val="accent1"/>
+          </a:fillRef>
+          <a:effectRef idx="0">
+            <a:schemeClr val="accent1"/>
+          </a:effectRef>
+          <a:fontRef idx="minor">
+            <a:schemeClr val="lt1"/>
+          </a:fontRef>
+        </p:style>
+        <p:txBody>
+          <a:bodyPr rtlCol="0" anchor="t"/>
+          <a:lstStyle/>
+          <a:p>
+            <a:pPr algn="just"/>
+            <a:endParaRPr lang="ko-KR" altLang="en-US" sz="4400" dirty="0">
+              <a:solidFill>
+                <a:schemeClr val="tx1"/>
+              </a:solidFill>
+              <a:latin typeface="Times New Roman" panose="02020603050405020304" pitchFamily="18" charset="0"/>
+              <a:cs typeface="Times New Roman" panose="02020603050405020304" pitchFamily="18" charset="0"/>
+            </a:endParaRPr>
+          </a:p>
+        </p:txBody>
+      </p:sp>
+      <p:sp>
+        <p:nvSpPr>
           <p:cNvPr id="129" name="Rounded Rectangle 1691"/>
           <p:cNvSpPr/>
           <p:nvPr/>
@@ -5629,7 +7540,7 @@
     </p:spTree>
     <p:extLst>
       <p:ext uri="{BB962C8B-B14F-4D97-AF65-F5344CB8AC3E}">
-        <p14:creationId xmlns:p14="http://schemas.microsoft.com/office/powerpoint/2010/main" val="1915647320"/>
+        <p14:creationId xmlns:p14="http://schemas.microsoft.com/office/powerpoint/2010/main" val="2530000636"/>
       </p:ext>
     </p:extLst>
   </p:cSld>

</xml_diff>